<commit_message>
updated deck of ML
</commit_message>
<xml_diff>
--- a/AI-ML-DL/Machine Learning.pptx
+++ b/AI-ML-DL/Machine Learning.pptx
@@ -224,7 +224,7 @@
           <a:p>
             <a:fld id="{1E5BB661-8884-4460-B9ED-FD0D9BF054C6}" type="datetimeFigureOut">
               <a:rPr lang="en-US" smtClean="0"/>
-              <a:t>6/7/2020</a:t>
+              <a:t>6/9/2020</a:t>
             </a:fld>
             <a:endParaRPr lang="en-US"/>
           </a:p>
@@ -713,7 +713,7 @@
           <a:p>
             <a:fld id="{99CA405F-FDE6-4D37-9F47-E73AA25D91EF}" type="datetimeFigureOut">
               <a:rPr lang="en-US" smtClean="0"/>
-              <a:t>6/7/2020</a:t>
+              <a:t>6/9/2020</a:t>
             </a:fld>
             <a:endParaRPr lang="en-US"/>
           </a:p>
@@ -881,7 +881,7 @@
           <a:p>
             <a:fld id="{99CA405F-FDE6-4D37-9F47-E73AA25D91EF}" type="datetimeFigureOut">
               <a:rPr lang="en-US" smtClean="0"/>
-              <a:t>6/7/2020</a:t>
+              <a:t>6/9/2020</a:t>
             </a:fld>
             <a:endParaRPr lang="en-US"/>
           </a:p>
@@ -1059,7 +1059,7 @@
           <a:p>
             <a:fld id="{99CA405F-FDE6-4D37-9F47-E73AA25D91EF}" type="datetimeFigureOut">
               <a:rPr lang="en-US" smtClean="0"/>
-              <a:t>6/7/2020</a:t>
+              <a:t>6/9/2020</a:t>
             </a:fld>
             <a:endParaRPr lang="en-US"/>
           </a:p>
@@ -1227,7 +1227,7 @@
           <a:p>
             <a:fld id="{99CA405F-FDE6-4D37-9F47-E73AA25D91EF}" type="datetimeFigureOut">
               <a:rPr lang="en-US" smtClean="0"/>
-              <a:t>6/7/2020</a:t>
+              <a:t>6/9/2020</a:t>
             </a:fld>
             <a:endParaRPr lang="en-US"/>
           </a:p>
@@ -1472,7 +1472,7 @@
           <a:p>
             <a:fld id="{99CA405F-FDE6-4D37-9F47-E73AA25D91EF}" type="datetimeFigureOut">
               <a:rPr lang="en-US" smtClean="0"/>
-              <a:t>6/7/2020</a:t>
+              <a:t>6/9/2020</a:t>
             </a:fld>
             <a:endParaRPr lang="en-US"/>
           </a:p>
@@ -1701,7 +1701,7 @@
           <a:p>
             <a:fld id="{99CA405F-FDE6-4D37-9F47-E73AA25D91EF}" type="datetimeFigureOut">
               <a:rPr lang="en-US" smtClean="0"/>
-              <a:t>6/7/2020</a:t>
+              <a:t>6/9/2020</a:t>
             </a:fld>
             <a:endParaRPr lang="en-US"/>
           </a:p>
@@ -2065,7 +2065,7 @@
           <a:p>
             <a:fld id="{99CA405F-FDE6-4D37-9F47-E73AA25D91EF}" type="datetimeFigureOut">
               <a:rPr lang="en-US" smtClean="0"/>
-              <a:t>6/7/2020</a:t>
+              <a:t>6/9/2020</a:t>
             </a:fld>
             <a:endParaRPr lang="en-US"/>
           </a:p>
@@ -2182,7 +2182,7 @@
           <a:p>
             <a:fld id="{99CA405F-FDE6-4D37-9F47-E73AA25D91EF}" type="datetimeFigureOut">
               <a:rPr lang="en-US" smtClean="0"/>
-              <a:t>6/7/2020</a:t>
+              <a:t>6/9/2020</a:t>
             </a:fld>
             <a:endParaRPr lang="en-US"/>
           </a:p>
@@ -2277,7 +2277,7 @@
           <a:p>
             <a:fld id="{99CA405F-FDE6-4D37-9F47-E73AA25D91EF}" type="datetimeFigureOut">
               <a:rPr lang="en-US" smtClean="0"/>
-              <a:t>6/7/2020</a:t>
+              <a:t>6/9/2020</a:t>
             </a:fld>
             <a:endParaRPr lang="en-US"/>
           </a:p>
@@ -2552,7 +2552,7 @@
           <a:p>
             <a:fld id="{99CA405F-FDE6-4D37-9F47-E73AA25D91EF}" type="datetimeFigureOut">
               <a:rPr lang="en-US" smtClean="0"/>
-              <a:t>6/7/2020</a:t>
+              <a:t>6/9/2020</a:t>
             </a:fld>
             <a:endParaRPr lang="en-US"/>
           </a:p>
@@ -2804,7 +2804,7 @@
           <a:p>
             <a:fld id="{99CA405F-FDE6-4D37-9F47-E73AA25D91EF}" type="datetimeFigureOut">
               <a:rPr lang="en-US" smtClean="0"/>
-              <a:t>6/7/2020</a:t>
+              <a:t>6/9/2020</a:t>
             </a:fld>
             <a:endParaRPr lang="en-US"/>
           </a:p>
@@ -3015,7 +3015,7 @@
           <a:p>
             <a:fld id="{99CA405F-FDE6-4D37-9F47-E73AA25D91EF}" type="datetimeFigureOut">
               <a:rPr lang="en-US" smtClean="0"/>
-              <a:t>6/7/2020</a:t>
+              <a:t>6/9/2020</a:t>
             </a:fld>
             <a:endParaRPr lang="en-US"/>
           </a:p>
@@ -4384,6 +4384,30 @@
           </a:p>
         </p:txBody>
       </p:sp>
+      <p:pic>
+        <p:nvPicPr>
+          <p:cNvPr id="2" name="Picture 1"/>
+          <p:cNvPicPr>
+            <a:picLocks noChangeAspect="1"/>
+          </p:cNvPicPr>
+          <p:nvPr/>
+        </p:nvPicPr>
+        <p:blipFill>
+          <a:blip r:embed="rId2"/>
+          <a:stretch>
+            <a:fillRect/>
+          </a:stretch>
+        </p:blipFill>
+        <p:spPr>
+          <a:xfrm>
+            <a:off x="5097504" y="1734947"/>
+            <a:ext cx="5495540" cy="4698687"/>
+          </a:xfrm>
+          <a:prstGeom prst="rect">
+            <a:avLst/>
+          </a:prstGeom>
+        </p:spPr>
+      </p:pic>
     </p:spTree>
     <p:extLst>
       <p:ext uri="{BB962C8B-B14F-4D97-AF65-F5344CB8AC3E}">
@@ -6295,7 +6319,6 @@
               <a:rPr lang="en-US" sz="2000" i="1" dirty="0" smtClean="0"/>
               <a:t>“Data refers to facts and statistics collected together for reference or analysis”</a:t>
             </a:r>
-            <a:endParaRPr lang="en-US" sz="2000" i="1" dirty="0" smtClean="0"/>
           </a:p>
           <a:p>
             <a:pPr algn="l"/>
@@ -6315,7 +6338,6 @@
               <a:rPr lang="en-US" sz="3600" dirty="0" smtClean="0"/>
               <a:t>Data</a:t>
             </a:r>
-            <a:endParaRPr lang="en-US" sz="3600" dirty="0" smtClean="0"/>
           </a:p>
           <a:p>
             <a:pPr algn="l"/>
@@ -7288,6 +7310,21 @@
 </file>
 
 <file path=customXml/item1.xml><?xml version="1.0" encoding="utf-8"?>
+<?mso-contentType ?>
+<FormTemplates xmlns="http://schemas.microsoft.com/sharepoint/v3/contenttype/forms">
+  <Display>DocumentLibraryForm</Display>
+  <Edit>DocumentLibraryForm</Edit>
+  <New>DocumentLibraryForm</New>
+</FormTemplates>
+</file>
+
+<file path=customXml/item2.xml><?xml version="1.0" encoding="utf-8"?>
+<p:properties xmlns:p="http://schemas.microsoft.com/office/2006/metadata/properties" xmlns:xsi="http://www.w3.org/2001/XMLSchema-instance" xmlns:pc="http://schemas.microsoft.com/office/infopath/2007/PartnerControls">
+  <documentManagement/>
+</p:properties>
+</file>
+
+<file path=customXml/item3.xml><?xml version="1.0" encoding="utf-8"?>
 <ct:contentTypeSchema xmlns:ct="http://schemas.microsoft.com/office/2006/metadata/contentType" xmlns:ma="http://schemas.microsoft.com/office/2006/metadata/properties/metaAttributes" ct:_="" ma:_="" ma:contentTypeName="Document" ma:contentTypeID="0x01010040A75B615E1C194CABC80F3CAEA6E4E5" ma:contentTypeVersion="9" ma:contentTypeDescription="Create a new document." ma:contentTypeScope="" ma:versionID="4a1cf2a28ba0a9e91fab658e05820dde">
   <xsd:schema xmlns:xsd="http://www.w3.org/2001/XMLSchema" xmlns:xs="http://www.w3.org/2001/XMLSchema" xmlns:p="http://schemas.microsoft.com/office/2006/metadata/properties" xmlns:ns3="d97dfd74-0758-4aac-b7c3-4f13d10397e8" xmlns:ns4="851bce1a-01c5-49d9-967d-64af5945ebef" targetNamespace="http://schemas.microsoft.com/office/2006/metadata/properties" ma:root="true" ma:fieldsID="090359357a8ddcd8bb6253bd66cd91d0" ns3:_="" ns4:_="">
     <xsd:import namespace="d97dfd74-0758-4aac-b7c3-4f13d10397e8"/>
@@ -7484,22 +7521,32 @@
 </ct:contentTypeSchema>
 </file>
 
-<file path=customXml/item2.xml><?xml version="1.0" encoding="utf-8"?>
-<p:properties xmlns:p="http://schemas.microsoft.com/office/2006/metadata/properties" xmlns:xsi="http://www.w3.org/2001/XMLSchema-instance" xmlns:pc="http://schemas.microsoft.com/office/infopath/2007/PartnerControls">
-  <documentManagement/>
-</p:properties>
+<file path=customXml/itemProps1.xml><?xml version="1.0" encoding="utf-8"?>
+<ds:datastoreItem xmlns:ds="http://schemas.openxmlformats.org/officeDocument/2006/customXml" ds:itemID="{9A56549F-9000-409B-8EE1-A7AE4257567A}">
+  <ds:schemaRefs>
+    <ds:schemaRef ds:uri="http://schemas.microsoft.com/sharepoint/v3/contenttype/forms"/>
+  </ds:schemaRefs>
+</ds:datastoreItem>
 </file>
 
-<file path=customXml/item3.xml><?xml version="1.0" encoding="utf-8"?>
-<?mso-contentType ?>
-<FormTemplates xmlns="http://schemas.microsoft.com/sharepoint/v3/contenttype/forms">
-  <Display>DocumentLibraryForm</Display>
-  <Edit>DocumentLibraryForm</Edit>
-  <New>DocumentLibraryForm</New>
-</FormTemplates>
+<file path=customXml/itemProps2.xml><?xml version="1.0" encoding="utf-8"?>
+<ds:datastoreItem xmlns:ds="http://schemas.openxmlformats.org/officeDocument/2006/customXml" ds:itemID="{AC2D31F3-7864-444C-82A7-D6387F098876}">
+  <ds:schemaRefs>
+    <ds:schemaRef ds:uri="http://purl.org/dc/terms/"/>
+    <ds:schemaRef ds:uri="http://schemas.openxmlformats.org/package/2006/metadata/core-properties"/>
+    <ds:schemaRef ds:uri="http://purl.org/dc/dcmitype/"/>
+    <ds:schemaRef ds:uri="http://schemas.microsoft.com/office/infopath/2007/PartnerControls"/>
+    <ds:schemaRef ds:uri="http://purl.org/dc/elements/1.1/"/>
+    <ds:schemaRef ds:uri="http://schemas.microsoft.com/office/2006/metadata/properties"/>
+    <ds:schemaRef ds:uri="http://schemas.microsoft.com/office/2006/documentManagement/types"/>
+    <ds:schemaRef ds:uri="d97dfd74-0758-4aac-b7c3-4f13d10397e8"/>
+    <ds:schemaRef ds:uri="851bce1a-01c5-49d9-967d-64af5945ebef"/>
+    <ds:schemaRef ds:uri="http://www.w3.org/XML/1998/namespace"/>
+  </ds:schemaRefs>
+</ds:datastoreItem>
 </file>
 
-<file path=customXml/itemProps1.xml><?xml version="1.0" encoding="utf-8"?>
+<file path=customXml/itemProps3.xml><?xml version="1.0" encoding="utf-8"?>
 <ds:datastoreItem xmlns:ds="http://schemas.openxmlformats.org/officeDocument/2006/customXml" ds:itemID="{A173A3F4-56E8-4506-812D-90D9C8F7ED90}">
   <ds:schemaRefs>
     <ds:schemaRef ds:uri="http://schemas.microsoft.com/office/2006/metadata/contentType"/>
@@ -7516,29 +7563,4 @@
     <ds:schemaRef ds:uri="http://schemas.microsoft.com/internal/obd"/>
   </ds:schemaRefs>
 </ds:datastoreItem>
-</file>
-
-<file path=customXml/itemProps2.xml><?xml version="1.0" encoding="utf-8"?>
-<ds:datastoreItem xmlns:ds="http://schemas.openxmlformats.org/officeDocument/2006/customXml" ds:itemID="{AC2D31F3-7864-444C-82A7-D6387F098876}">
-  <ds:schemaRefs>
-    <ds:schemaRef ds:uri="d97dfd74-0758-4aac-b7c3-4f13d10397e8"/>
-    <ds:schemaRef ds:uri="http://purl.org/dc/terms/"/>
-    <ds:schemaRef ds:uri="http://schemas.openxmlformats.org/package/2006/metadata/core-properties"/>
-    <ds:schemaRef ds:uri="http://purl.org/dc/dcmitype/"/>
-    <ds:schemaRef ds:uri="http://schemas.microsoft.com/office/infopath/2007/PartnerControls"/>
-    <ds:schemaRef ds:uri="http://schemas.microsoft.com/office/2006/documentManagement/types"/>
-    <ds:schemaRef ds:uri="http://purl.org/dc/elements/1.1/"/>
-    <ds:schemaRef ds:uri="http://schemas.microsoft.com/office/2006/metadata/properties"/>
-    <ds:schemaRef ds:uri="851bce1a-01c5-49d9-967d-64af5945ebef"/>
-    <ds:schemaRef ds:uri="http://www.w3.org/XML/1998/namespace"/>
-  </ds:schemaRefs>
-</ds:datastoreItem>
-</file>
-
-<file path=customXml/itemProps3.xml><?xml version="1.0" encoding="utf-8"?>
-<ds:datastoreItem xmlns:ds="http://schemas.openxmlformats.org/officeDocument/2006/customXml" ds:itemID="{9A56549F-9000-409B-8EE1-A7AE4257567A}">
-  <ds:schemaRefs>
-    <ds:schemaRef ds:uri="http://schemas.microsoft.com/sharepoint/v3/contenttype/forms"/>
-  </ds:schemaRefs>
-</ds:datastoreItem>
 </file>
</xml_diff>

<commit_message>
add ml ipynb file and .csv
</commit_message>
<xml_diff>
--- a/AI-ML-DL/Machine Learning.pptx
+++ b/AI-ML-DL/Machine Learning.pptx
@@ -580,6 +580,96 @@
     <p:extLst>
       <p:ext uri="{BB962C8B-B14F-4D97-AF65-F5344CB8AC3E}">
         <p14:creationId xmlns:p14="http://schemas.microsoft.com/office/powerpoint/2010/main" val="874215006"/>
+      </p:ext>
+    </p:extLst>
+  </p:cSld>
+  <p:clrMapOvr>
+    <a:masterClrMapping/>
+  </p:clrMapOvr>
+</p:notes>
+</file>
+
+<file path=ppt/notesSlides/notesSlide2.xml><?xml version="1.0" encoding="utf-8"?>
+<p:notes xmlns:a="http://schemas.openxmlformats.org/drawingml/2006/main" xmlns:r="http://schemas.openxmlformats.org/officeDocument/2006/relationships" xmlns:p="http://schemas.openxmlformats.org/presentationml/2006/main">
+  <p:cSld>
+    <p:spTree>
+      <p:nvGrpSpPr>
+        <p:cNvPr id="1" name=""/>
+        <p:cNvGrpSpPr/>
+        <p:nvPr/>
+      </p:nvGrpSpPr>
+      <p:grpSpPr>
+        <a:xfrm>
+          <a:off x="0" y="0"/>
+          <a:ext cx="0" cy="0"/>
+          <a:chOff x="0" y="0"/>
+          <a:chExt cx="0" cy="0"/>
+        </a:xfrm>
+      </p:grpSpPr>
+      <p:sp>
+        <p:nvSpPr>
+          <p:cNvPr id="2" name="Slide Image Placeholder 1"/>
+          <p:cNvSpPr>
+            <a:spLocks noGrp="1" noRot="1" noChangeAspect="1"/>
+          </p:cNvSpPr>
+          <p:nvPr>
+            <p:ph type="sldImg"/>
+          </p:nvPr>
+        </p:nvSpPr>
+        <p:spPr/>
+      </p:sp>
+      <p:sp>
+        <p:nvSpPr>
+          <p:cNvPr id="3" name="Notes Placeholder 2"/>
+          <p:cNvSpPr>
+            <a:spLocks noGrp="1"/>
+          </p:cNvSpPr>
+          <p:nvPr>
+            <p:ph type="body" idx="1"/>
+          </p:nvPr>
+        </p:nvSpPr>
+        <p:spPr/>
+        <p:txBody>
+          <a:bodyPr/>
+          <a:lstStyle/>
+          <a:p>
+            <a:r>
+              <a:rPr lang="en-US">
+                <a:hlinkClick r:id="rId3"/>
+              </a:rPr>
+              <a:t>https://www.kaggle.com/codefordata/headbrain-simple-linear-regression</a:t>
+            </a:r>
+            <a:endParaRPr lang="en-US"/>
+          </a:p>
+        </p:txBody>
+      </p:sp>
+      <p:sp>
+        <p:nvSpPr>
+          <p:cNvPr id="4" name="Slide Number Placeholder 3"/>
+          <p:cNvSpPr>
+            <a:spLocks noGrp="1"/>
+          </p:cNvSpPr>
+          <p:nvPr>
+            <p:ph type="sldNum" sz="quarter" idx="5"/>
+          </p:nvPr>
+        </p:nvSpPr>
+        <p:spPr/>
+        <p:txBody>
+          <a:bodyPr/>
+          <a:lstStyle/>
+          <a:p>
+            <a:fld id="{95EDE83F-F192-4237-87E6-BD69D3B8E2F0}" type="slidenum">
+              <a:rPr lang="en-US" smtClean="0"/>
+              <a:t>21</a:t>
+            </a:fld>
+            <a:endParaRPr lang="en-US"/>
+          </a:p>
+        </p:txBody>
+      </p:sp>
+    </p:spTree>
+    <p:extLst>
+      <p:ext uri="{BB962C8B-B14F-4D97-AF65-F5344CB8AC3E}">
+        <p14:creationId xmlns:p14="http://schemas.microsoft.com/office/powerpoint/2010/main" val="2269815704"/>
       </p:ext>
     </p:extLst>
   </p:cSld>
@@ -7630,7 +7720,7 @@
           <p:nvPr/>
         </p:nvPicPr>
         <p:blipFill>
-          <a:blip r:embed="rId2"/>
+          <a:blip r:embed="rId3"/>
           <a:stretch>
             <a:fillRect/>
           </a:stretch>
@@ -7660,7 +7750,7 @@
           <p:nvPr/>
         </p:nvPicPr>
         <p:blipFill>
-          <a:blip r:embed="rId3"/>
+          <a:blip r:embed="rId4"/>
           <a:stretch>
             <a:fillRect/>
           </a:stretch>
@@ -10038,15 +10128,6 @@
 </file>
 
 <file path=customXml/item1.xml><?xml version="1.0" encoding="utf-8"?>
-<?mso-contentType ?>
-<FormTemplates xmlns="http://schemas.microsoft.com/sharepoint/v3/contenttype/forms">
-  <Display>DocumentLibraryForm</Display>
-  <Edit>DocumentLibraryForm</Edit>
-  <New>DocumentLibraryForm</New>
-</FormTemplates>
-</file>
-
-<file path=customXml/item2.xml><?xml version="1.0" encoding="utf-8"?>
 <ct:contentTypeSchema xmlns:ct="http://schemas.microsoft.com/office/2006/metadata/contentType" xmlns:ma="http://schemas.microsoft.com/office/2006/metadata/properties/metaAttributes" ct:_="" ma:_="" ma:contentTypeName="Document" ma:contentTypeID="0x01010040A75B615E1C194CABC80F3CAEA6E4E5" ma:contentTypeVersion="9" ma:contentTypeDescription="Create a new document." ma:contentTypeScope="" ma:versionID="4a1cf2a28ba0a9e91fab658e05820dde">
   <xsd:schema xmlns:xsd="http://www.w3.org/2001/XMLSchema" xmlns:xs="http://www.w3.org/2001/XMLSchema" xmlns:p="http://schemas.microsoft.com/office/2006/metadata/properties" xmlns:ns3="d97dfd74-0758-4aac-b7c3-4f13d10397e8" xmlns:ns4="851bce1a-01c5-49d9-967d-64af5945ebef" targetNamespace="http://schemas.microsoft.com/office/2006/metadata/properties" ma:root="true" ma:fieldsID="090359357a8ddcd8bb6253bd66cd91d0" ns3:_="" ns4:_="">
     <xsd:import namespace="d97dfd74-0758-4aac-b7c3-4f13d10397e8"/>
@@ -10243,6 +10324,15 @@
 </ct:contentTypeSchema>
 </file>
 
+<file path=customXml/item2.xml><?xml version="1.0" encoding="utf-8"?>
+<?mso-contentType ?>
+<FormTemplates xmlns="http://schemas.microsoft.com/sharepoint/v3/contenttype/forms">
+  <Display>DocumentLibraryForm</Display>
+  <Edit>DocumentLibraryForm</Edit>
+  <New>DocumentLibraryForm</New>
+</FormTemplates>
+</file>
+
 <file path=customXml/item3.xml><?xml version="1.0" encoding="utf-8"?>
 <p:properties xmlns:p="http://schemas.microsoft.com/office/2006/metadata/properties" xmlns:xsi="http://www.w3.org/2001/XMLSchema-instance" xmlns:pc="http://schemas.microsoft.com/office/infopath/2007/PartnerControls">
   <documentManagement/>
@@ -10250,14 +10340,6 @@
 </file>
 
 <file path=customXml/itemProps1.xml><?xml version="1.0" encoding="utf-8"?>
-<ds:datastoreItem xmlns:ds="http://schemas.openxmlformats.org/officeDocument/2006/customXml" ds:itemID="{9A56549F-9000-409B-8EE1-A7AE4257567A}">
-  <ds:schemaRefs>
-    <ds:schemaRef ds:uri="http://schemas.microsoft.com/sharepoint/v3/contenttype/forms"/>
-  </ds:schemaRefs>
-</ds:datastoreItem>
-</file>
-
-<file path=customXml/itemProps2.xml><?xml version="1.0" encoding="utf-8"?>
 <ds:datastoreItem xmlns:ds="http://schemas.openxmlformats.org/officeDocument/2006/customXml" ds:itemID="{A173A3F4-56E8-4506-812D-90D9C8F7ED90}">
   <ds:schemaRefs>
     <ds:schemaRef ds:uri="http://schemas.microsoft.com/office/2006/metadata/contentType"/>
@@ -10272,6 +10354,14 @@
     <ds:schemaRef ds:uri="http://purl.org/dc/elements/1.1/"/>
     <ds:schemaRef ds:uri="http://purl.org/dc/terms/"/>
     <ds:schemaRef ds:uri="http://schemas.microsoft.com/internal/obd"/>
+  </ds:schemaRefs>
+</ds:datastoreItem>
+</file>
+
+<file path=customXml/itemProps2.xml><?xml version="1.0" encoding="utf-8"?>
+<ds:datastoreItem xmlns:ds="http://schemas.openxmlformats.org/officeDocument/2006/customXml" ds:itemID="{9A56549F-9000-409B-8EE1-A7AE4257567A}">
+  <ds:schemaRefs>
+    <ds:schemaRef ds:uri="http://schemas.microsoft.com/sharepoint/v3/contenttype/forms"/>
   </ds:schemaRefs>
 </ds:datastoreItem>
 </file>

</xml_diff>

<commit_message>
update ml.pptx and 2 ipynb files
</commit_message>
<xml_diff>
--- a/AI-ML-DL/Machine Learning.pptx
+++ b/AI-ML-DL/Machine Learning.pptx
@@ -5,13 +5,13 @@
     <p:sldMasterId id="2147483648" r:id="rId4"/>
   </p:sldMasterIdLst>
   <p:notesMasterIdLst>
-    <p:notesMasterId r:id="rId46"/>
+    <p:notesMasterId r:id="rId48"/>
   </p:notesMasterIdLst>
   <p:sldIdLst>
     <p:sldId id="256" r:id="rId5"/>
-    <p:sldId id="285" r:id="rId6"/>
-    <p:sldId id="296" r:id="rId7"/>
-    <p:sldId id="260" r:id="rId8"/>
+    <p:sldId id="296" r:id="rId6"/>
+    <p:sldId id="260" r:id="rId7"/>
+    <p:sldId id="285" r:id="rId8"/>
     <p:sldId id="289" r:id="rId9"/>
     <p:sldId id="291" r:id="rId10"/>
     <p:sldId id="293" r:id="rId11"/>
@@ -44,11 +44,13 @@
     <p:sldId id="264" r:id="rId38"/>
     <p:sldId id="265" r:id="rId39"/>
     <p:sldId id="287" r:id="rId40"/>
-    <p:sldId id="266" r:id="rId41"/>
-    <p:sldId id="294" r:id="rId42"/>
-    <p:sldId id="295" r:id="rId43"/>
-    <p:sldId id="297" r:id="rId44"/>
-    <p:sldId id="286" r:id="rId45"/>
+    <p:sldId id="299" r:id="rId41"/>
+    <p:sldId id="266" r:id="rId42"/>
+    <p:sldId id="294" r:id="rId43"/>
+    <p:sldId id="295" r:id="rId44"/>
+    <p:sldId id="297" r:id="rId45"/>
+    <p:sldId id="298" r:id="rId46"/>
+    <p:sldId id="286" r:id="rId47"/>
   </p:sldIdLst>
   <p:sldSz cx="12192000" cy="6858000"/>
   <p:notesSz cx="6858000" cy="9144000"/>
@@ -245,7 +247,7 @@
           <a:p>
             <a:fld id="{1E5BB661-8884-4460-B9ED-FD0D9BF054C6}" type="datetimeFigureOut">
               <a:rPr lang="en-US" smtClean="0"/>
-              <a:t>6/26/2020</a:t>
+              <a:t>6/27/2020</a:t>
             </a:fld>
             <a:endParaRPr lang="en-US"/>
           </a:p>
@@ -834,6 +836,47 @@
           <a:p>
             <a:endParaRPr lang="en-US" dirty="0"/>
           </a:p>
+          <a:p>
+            <a:pPr marL="0" marR="0" lvl="0" indent="0" algn="l" defTabSz="914400" rtl="0" eaLnBrk="1" fontAlgn="auto" latinLnBrk="0" hangingPunct="1">
+              <a:lnSpc>
+                <a:spcPct val="100000"/>
+              </a:lnSpc>
+              <a:spcBef>
+                <a:spcPts val="0"/>
+              </a:spcBef>
+              <a:spcAft>
+                <a:spcPts val="0"/>
+              </a:spcAft>
+              <a:buClrTx/>
+              <a:buSzTx/>
+              <a:buFontTx/>
+              <a:buNone/>
+              <a:tabLst/>
+              <a:defRPr/>
+            </a:pPr>
+            <a:r>
+              <a:rPr lang="en-US" dirty="0"/>
+              <a:t>80-90s: </a:t>
+            </a:r>
+            <a:r>
+              <a:rPr lang="en-US" sz="1200" dirty="0"/>
+              <a:t>Guzman-&gt;Huffman-&gt;Waltz (decision tree, SVM)</a:t>
+            </a:r>
+          </a:p>
+          <a:p>
+            <a:r>
+              <a:rPr lang="en-US" dirty="0"/>
+              <a:t>2012: Alex </a:t>
+            </a:r>
+            <a:r>
+              <a:rPr lang="en-US" dirty="0" err="1"/>
+              <a:t>Krizhevsky</a:t>
+            </a:r>
+            <a:r>
+              <a:rPr lang="en-US" dirty="0"/>
+              <a:t> – University of Toronto</a:t>
+            </a:r>
+          </a:p>
         </p:txBody>
       </p:sp>
       <p:sp>
@@ -853,7 +896,7 @@
           <a:p>
             <a:fld id="{95EDE83F-F192-4237-87E6-BD69D3B8E2F0}" type="slidenum">
               <a:rPr lang="en-US" smtClean="0"/>
-              <a:t>4</a:t>
+              <a:t>3</a:t>
             </a:fld>
             <a:endParaRPr lang="en-US"/>
           </a:p>
@@ -1668,7 +1711,7 @@
           <a:p>
             <a:fld id="{99CA405F-FDE6-4D37-9F47-E73AA25D91EF}" type="datetimeFigureOut">
               <a:rPr lang="en-US" smtClean="0"/>
-              <a:t>6/26/2020</a:t>
+              <a:t>6/27/2020</a:t>
             </a:fld>
             <a:endParaRPr lang="en-US"/>
           </a:p>
@@ -1836,7 +1879,7 @@
           <a:p>
             <a:fld id="{99CA405F-FDE6-4D37-9F47-E73AA25D91EF}" type="datetimeFigureOut">
               <a:rPr lang="en-US" smtClean="0"/>
-              <a:t>6/26/2020</a:t>
+              <a:t>6/27/2020</a:t>
             </a:fld>
             <a:endParaRPr lang="en-US"/>
           </a:p>
@@ -2014,7 +2057,7 @@
           <a:p>
             <a:fld id="{99CA405F-FDE6-4D37-9F47-E73AA25D91EF}" type="datetimeFigureOut">
               <a:rPr lang="en-US" smtClean="0"/>
-              <a:t>6/26/2020</a:t>
+              <a:t>6/27/2020</a:t>
             </a:fld>
             <a:endParaRPr lang="en-US"/>
           </a:p>
@@ -2182,7 +2225,7 @@
           <a:p>
             <a:fld id="{99CA405F-FDE6-4D37-9F47-E73AA25D91EF}" type="datetimeFigureOut">
               <a:rPr lang="en-US" smtClean="0"/>
-              <a:t>6/26/2020</a:t>
+              <a:t>6/27/2020</a:t>
             </a:fld>
             <a:endParaRPr lang="en-US"/>
           </a:p>
@@ -2427,7 +2470,7 @@
           <a:p>
             <a:fld id="{99CA405F-FDE6-4D37-9F47-E73AA25D91EF}" type="datetimeFigureOut">
               <a:rPr lang="en-US" smtClean="0"/>
-              <a:t>6/26/2020</a:t>
+              <a:t>6/27/2020</a:t>
             </a:fld>
             <a:endParaRPr lang="en-US"/>
           </a:p>
@@ -2656,7 +2699,7 @@
           <a:p>
             <a:fld id="{99CA405F-FDE6-4D37-9F47-E73AA25D91EF}" type="datetimeFigureOut">
               <a:rPr lang="en-US" smtClean="0"/>
-              <a:t>6/26/2020</a:t>
+              <a:t>6/27/2020</a:t>
             </a:fld>
             <a:endParaRPr lang="en-US"/>
           </a:p>
@@ -3020,7 +3063,7 @@
           <a:p>
             <a:fld id="{99CA405F-FDE6-4D37-9F47-E73AA25D91EF}" type="datetimeFigureOut">
               <a:rPr lang="en-US" smtClean="0"/>
-              <a:t>6/26/2020</a:t>
+              <a:t>6/27/2020</a:t>
             </a:fld>
             <a:endParaRPr lang="en-US"/>
           </a:p>
@@ -3137,7 +3180,7 @@
           <a:p>
             <a:fld id="{99CA405F-FDE6-4D37-9F47-E73AA25D91EF}" type="datetimeFigureOut">
               <a:rPr lang="en-US" smtClean="0"/>
-              <a:t>6/26/2020</a:t>
+              <a:t>6/27/2020</a:t>
             </a:fld>
             <a:endParaRPr lang="en-US"/>
           </a:p>
@@ -3232,7 +3275,7 @@
           <a:p>
             <a:fld id="{99CA405F-FDE6-4D37-9F47-E73AA25D91EF}" type="datetimeFigureOut">
               <a:rPr lang="en-US" smtClean="0"/>
-              <a:t>6/26/2020</a:t>
+              <a:t>6/27/2020</a:t>
             </a:fld>
             <a:endParaRPr lang="en-US"/>
           </a:p>
@@ -3507,7 +3550,7 @@
           <a:p>
             <a:fld id="{99CA405F-FDE6-4D37-9F47-E73AA25D91EF}" type="datetimeFigureOut">
               <a:rPr lang="en-US" smtClean="0"/>
-              <a:t>6/26/2020</a:t>
+              <a:t>6/27/2020</a:t>
             </a:fld>
             <a:endParaRPr lang="en-US"/>
           </a:p>
@@ -3759,7 +3802,7 @@
           <a:p>
             <a:fld id="{99CA405F-FDE6-4D37-9F47-E73AA25D91EF}" type="datetimeFigureOut">
               <a:rPr lang="en-US" smtClean="0"/>
-              <a:t>6/26/2020</a:t>
+              <a:t>6/27/2020</a:t>
             </a:fld>
             <a:endParaRPr lang="en-US"/>
           </a:p>
@@ -3970,7 +4013,7 @@
           <a:p>
             <a:fld id="{99CA405F-FDE6-4D37-9F47-E73AA25D91EF}" type="datetimeFigureOut">
               <a:rPr lang="en-US" smtClean="0"/>
-              <a:t>6/26/2020</a:t>
+              <a:t>6/27/2020</a:t>
             </a:fld>
             <a:endParaRPr lang="en-US"/>
           </a:p>
@@ -4661,10 +4704,6 @@
           </a:p>
           <a:p>
             <a:pPr algn="l"/>
-            <a:r>
-              <a:rPr lang="en-US" sz="6600" dirty="0"/>
-              <a:t/>
-            </a:r>
             <a:br>
               <a:rPr lang="en-US" sz="6600" dirty="0"/>
             </a:br>
@@ -4702,7 +4741,7 @@
           <a:p>
             <a:r>
               <a:rPr lang="en-US" sz="3200" dirty="0"/>
-              <a:t>Class-3: Machine Learning Algorithms</a:t>
+              <a:t>Class-1: Machine Learning Algorithms</a:t>
             </a:r>
           </a:p>
         </p:txBody>
@@ -5280,7 +5319,7 @@
             <a:pPr algn="l"/>
             <a:r>
               <a:rPr lang="en-US" sz="3600" dirty="0"/>
-              <a:t>		Nominal Data vs. Ordinal Data</a:t>
+              <a:t>		Nominal Data (Scalar) vs. Ordinal Data (Vector)</a:t>
             </a:r>
           </a:p>
           <a:p>
@@ -5322,22 +5361,14 @@
             <a:pPr algn="l"/>
             <a:r>
               <a:rPr lang="en-US" sz="3600" dirty="0"/>
-              <a:t>	Measure of </a:t>
-            </a:r>
-            <a:r>
-              <a:rPr lang="en-US" sz="3600" dirty="0" err="1"/>
-              <a:t>Variablitity</a:t>
-            </a:r>
+              <a:t>	Measure of Variability (spread) </a:t>
+            </a:r>
+          </a:p>
+          <a:p>
+            <a:pPr algn="l"/>
             <a:r>
               <a:rPr lang="en-US" sz="3600" dirty="0"/>
-              <a:t> (spread) </a:t>
-            </a:r>
-          </a:p>
-          <a:p>
-            <a:pPr algn="l"/>
-            <a:r>
-              <a:rPr lang="en-US" sz="3600" dirty="0"/>
-              <a:t>	Maximum, Average, Minimum, </a:t>
+              <a:t>	Maximum, Average, Minimum, …</a:t>
             </a:r>
           </a:p>
           <a:p>
@@ -6141,13 +6172,7 @@
       </p:grpSpPr>
       <p:sp>
         <p:nvSpPr>
-          <p:cNvPr id="5" name="Subtitle 4">
-            <a:extLst>
-              <a:ext uri="{FF2B5EF4-FFF2-40B4-BE49-F238E27FC236}">
-                <a16:creationId xmlns:a16="http://schemas.microsoft.com/office/drawing/2014/main" id="{3956E86E-30CF-45A6-BB20-CCDE1F98460E}"/>
-              </a:ext>
-            </a:extLst>
-          </p:cNvPr>
+          <p:cNvPr id="3" name="Subtitle 2"/>
           <p:cNvSpPr>
             <a:spLocks noGrp="1"/>
           </p:cNvSpPr>
@@ -6157,52 +6182,189 @@
         </p:nvSpPr>
         <p:spPr>
           <a:xfrm>
-            <a:off x="1524000" y="3602038"/>
-            <a:ext cx="9144000" cy="1655762"/>
-          </a:xfrm>
-        </p:spPr>
-        <p:txBody>
-          <a:bodyPr/>
-          <a:lstStyle/>
-          <a:p>
-            <a:endParaRPr lang="en-US"/>
-          </a:p>
-        </p:txBody>
-      </p:sp>
-      <p:pic>
-        <p:nvPicPr>
-          <p:cNvPr id="6" name="Picture 5">
-            <a:extLst>
-              <a:ext uri="{FF2B5EF4-FFF2-40B4-BE49-F238E27FC236}">
-                <a16:creationId xmlns:a16="http://schemas.microsoft.com/office/drawing/2014/main" id="{0FD10501-A78B-4675-A1CA-259C04828DE1}"/>
-              </a:ext>
-            </a:extLst>
-          </p:cNvPr>
-          <p:cNvPicPr>
-            <a:picLocks noChangeAspect="1"/>
-          </p:cNvPicPr>
+            <a:off x="1802100" y="963680"/>
+            <a:ext cx="8738140" cy="5721844"/>
+          </a:xfrm>
+        </p:spPr>
+        <p:txBody>
+          <a:bodyPr>
+            <a:normAutofit fontScale="40000" lnSpcReduction="20000"/>
+          </a:bodyPr>
+          <a:lstStyle/>
+          <a:p>
+            <a:pPr algn="l"/>
+            <a:r>
+              <a:rPr lang="en-US" sz="6200" b="1" dirty="0"/>
+              <a:t>Top 10 Skills</a:t>
+            </a:r>
+            <a:r>
+              <a:rPr lang="en-US" sz="6200" dirty="0"/>
+              <a:t> (in increasing ranking order)</a:t>
+            </a:r>
+          </a:p>
+          <a:p>
+            <a:pPr algn="l"/>
+            <a:endParaRPr lang="en-US" sz="6200" dirty="0"/>
+          </a:p>
+          <a:p>
+            <a:pPr marL="1600200" lvl="1" indent="-1143000" algn="l">
+              <a:buFont typeface="+mj-lt"/>
+              <a:buAutoNum type="arabicPeriod"/>
+            </a:pPr>
+            <a:r>
+              <a:rPr lang="en-US" sz="5800" dirty="0"/>
+              <a:t>Python</a:t>
+            </a:r>
+          </a:p>
+          <a:p>
+            <a:pPr marL="1600200" lvl="1" indent="-1143000" algn="l">
+              <a:buFont typeface="+mj-lt"/>
+              <a:buAutoNum type="arabicPeriod"/>
+            </a:pPr>
+            <a:r>
+              <a:rPr lang="en-US" sz="5800" dirty="0"/>
+              <a:t>Linear Algebra</a:t>
+            </a:r>
+          </a:p>
+          <a:p>
+            <a:pPr marL="1600200" lvl="1" indent="-1143000" algn="l">
+              <a:buFont typeface="+mj-lt"/>
+              <a:buAutoNum type="arabicPeriod"/>
+            </a:pPr>
+            <a:r>
+              <a:rPr lang="en-US" sz="5800" dirty="0"/>
+              <a:t>Advance Signal Processing </a:t>
+            </a:r>
+          </a:p>
+          <a:p>
+            <a:pPr marL="1600200" lvl="1" indent="-1143000" algn="l">
+              <a:buFont typeface="+mj-lt"/>
+              <a:buAutoNum type="arabicPeriod"/>
+            </a:pPr>
+            <a:r>
+              <a:rPr lang="en-US" sz="5800" dirty="0"/>
+              <a:t>Applied Math &amp; Algorithms</a:t>
+            </a:r>
+          </a:p>
+          <a:p>
+            <a:pPr marL="1600200" lvl="1" indent="-1143000" algn="l">
+              <a:buFont typeface="+mj-lt"/>
+              <a:buAutoNum type="arabicPeriod"/>
+            </a:pPr>
+            <a:r>
+              <a:rPr lang="en-US" sz="5800" dirty="0"/>
+              <a:t>Neural Networks Architectures</a:t>
+            </a:r>
+          </a:p>
+          <a:p>
+            <a:pPr marL="1600200" lvl="1" indent="-1143000" algn="l">
+              <a:buFont typeface="+mj-lt"/>
+              <a:buAutoNum type="arabicPeriod"/>
+            </a:pPr>
+            <a:r>
+              <a:rPr lang="en-US" sz="5800" dirty="0"/>
+              <a:t>NLP</a:t>
+            </a:r>
+          </a:p>
+          <a:p>
+            <a:pPr lvl="1" algn="l"/>
+            <a:r>
+              <a:rPr lang="en-US" sz="5800" dirty="0"/>
+              <a:t>-----------------------</a:t>
+            </a:r>
+          </a:p>
+          <a:p>
+            <a:pPr marL="1600200" lvl="1" indent="-1143000" algn="l">
+              <a:buFont typeface="+mj-lt"/>
+              <a:buAutoNum type="arabicPeriod"/>
+            </a:pPr>
+            <a:r>
+              <a:rPr lang="en-US" sz="5800" dirty="0"/>
+              <a:t>Industry Knowledge</a:t>
+            </a:r>
+          </a:p>
+          <a:p>
+            <a:pPr marL="1600200" lvl="1" indent="-1143000" algn="l">
+              <a:buFont typeface="+mj-lt"/>
+              <a:buAutoNum type="arabicPeriod"/>
+            </a:pPr>
+            <a:r>
+              <a:rPr lang="en-US" sz="5800" dirty="0"/>
+              <a:t>Effective Communication</a:t>
+            </a:r>
+          </a:p>
+          <a:p>
+            <a:pPr marL="1600200" lvl="1" indent="-1143000" algn="l">
+              <a:buFont typeface="+mj-lt"/>
+              <a:buAutoNum type="arabicPeriod"/>
+            </a:pPr>
+            <a:r>
+              <a:rPr lang="en-US" sz="5800" dirty="0"/>
+              <a:t>Rapid Prototyping</a:t>
+            </a:r>
+          </a:p>
+          <a:p>
+            <a:pPr marL="1600200" lvl="1" indent="-1143000" algn="l">
+              <a:buFont typeface="+mj-lt"/>
+              <a:buAutoNum type="arabicPeriod"/>
+            </a:pPr>
+            <a:r>
+              <a:rPr lang="en-US" sz="5800" dirty="0"/>
+              <a:t>Keep It Up/updated</a:t>
+            </a:r>
+          </a:p>
+          <a:p>
+            <a:pPr marL="1600200" lvl="1" indent="-1143000" algn="l">
+              <a:buFont typeface="+mj-lt"/>
+              <a:buAutoNum type="arabicPeriod" startAt="10"/>
+            </a:pPr>
+            <a:endParaRPr lang="en-US" sz="5400" dirty="0"/>
+          </a:p>
+          <a:p>
+            <a:pPr lvl="1" algn="l"/>
+            <a:br>
+              <a:rPr lang="en-US" sz="6200" dirty="0"/>
+            </a:br>
+            <a:endParaRPr lang="en-US" sz="6200" dirty="0"/>
+          </a:p>
+        </p:txBody>
+      </p:sp>
+      <p:sp>
+        <p:nvSpPr>
+          <p:cNvPr id="4" name="TextBox 3"/>
+          <p:cNvSpPr txBox="1"/>
           <p:nvPr/>
-        </p:nvPicPr>
-        <p:blipFill>
-          <a:blip r:embed="rId2"/>
-          <a:stretch>
-            <a:fillRect/>
-          </a:stretch>
-        </p:blipFill>
-        <p:spPr>
-          <a:xfrm>
-            <a:off x="0" y="123446"/>
-            <a:ext cx="12192000" cy="6611107"/>
+        </p:nvSpPr>
+        <p:spPr>
+          <a:xfrm>
+            <a:off x="95429" y="101906"/>
+            <a:ext cx="5644109" cy="861774"/>
           </a:xfrm>
           <a:prstGeom prst="rect">
             <a:avLst/>
           </a:prstGeom>
-        </p:spPr>
-      </p:pic>
+          <a:noFill/>
+        </p:spPr>
+        <p:txBody>
+          <a:bodyPr wrap="none" rtlCol="0">
+            <a:spAutoFit/>
+          </a:bodyPr>
+          <a:lstStyle/>
+          <a:p>
+            <a:r>
+              <a:rPr lang="en-US" sz="3200" dirty="0"/>
+              <a:t>Who is a ML Engineer/Scientist? </a:t>
+            </a:r>
+          </a:p>
+          <a:p>
+            <a:endParaRPr lang="en-US" dirty="0"/>
+          </a:p>
+        </p:txBody>
+      </p:sp>
     </p:spTree>
     <p:extLst>
       <p:ext uri="{BB962C8B-B14F-4D97-AF65-F5344CB8AC3E}">
-        <p14:creationId xmlns:p14="http://schemas.microsoft.com/office/powerpoint/2010/main" val="3230676015"/>
+        <p14:creationId xmlns:p14="http://schemas.microsoft.com/office/powerpoint/2010/main" val="728681631"/>
       </p:ext>
     </p:extLst>
   </p:cSld>
@@ -6590,7 +6752,7 @@
                 <a16:creationId xmlns:a16="http://schemas.microsoft.com/office/drawing/2014/main" id="{DEE5C6BA-FE2A-4C38-8D88-E70C06E54F82}"/>
               </a:ext>
               <a:ext uri="{C183D7F6-B498-43B3-948B-1728B52AA6E4}">
-                <adec:decorative xmlns:adec="http://schemas.microsoft.com/office/drawing/2017/decorative" xmlns="" val="1"/>
+                <adec:decorative xmlns:adec="http://schemas.microsoft.com/office/drawing/2017/decorative" val="1"/>
               </a:ext>
             </a:extLst>
           </p:cNvPr>
@@ -6676,7 +6838,7 @@
                 <a16:creationId xmlns:a16="http://schemas.microsoft.com/office/drawing/2014/main" id="{53E66F28-0926-4CFB-BDAB-646CAB184CB0}"/>
               </a:ext>
               <a:ext uri="{C183D7F6-B498-43B3-948B-1728B52AA6E4}">
-                <adec:decorative xmlns:adec="http://schemas.microsoft.com/office/drawing/2017/decorative" xmlns="" val="1"/>
+                <adec:decorative xmlns:adec="http://schemas.microsoft.com/office/drawing/2017/decorative" val="1"/>
               </a:ext>
             </a:extLst>
           </p:cNvPr>
@@ -6767,7 +6929,7 @@
                 <a16:creationId xmlns:a16="http://schemas.microsoft.com/office/drawing/2014/main" id="{DE9FA85F-F0FB-4952-A05F-04CC67B18EE5}"/>
               </a:ext>
               <a:ext uri="{C183D7F6-B498-43B3-948B-1728B52AA6E4}">
-                <adec:decorative xmlns:adec="http://schemas.microsoft.com/office/drawing/2017/decorative" xmlns="" val="1"/>
+                <adec:decorative xmlns:adec="http://schemas.microsoft.com/office/drawing/2017/decorative" val="1"/>
               </a:ext>
             </a:extLst>
           </p:cNvPr>
@@ -7213,7 +7375,7 @@
                 <a16:creationId xmlns:a16="http://schemas.microsoft.com/office/drawing/2014/main" id="{FEBD362A-CC27-47D9-8FC3-A5E91BA0760C}"/>
               </a:ext>
               <a:ext uri="{C183D7F6-B498-43B3-948B-1728B52AA6E4}">
-                <adec:decorative xmlns:adec="http://schemas.microsoft.com/office/drawing/2017/decorative" xmlns="" val="1"/>
+                <adec:decorative xmlns:adec="http://schemas.microsoft.com/office/drawing/2017/decorative" val="1"/>
               </a:ext>
             </a:extLst>
           </p:cNvPr>
@@ -8057,7 +8219,7 @@
           <a:p>
             <a:r>
               <a:rPr lang="en-US" sz="3200" dirty="0"/>
-              <a:t>Class-3: Supervised Learning Algorithms</a:t>
+              <a:t>Class-2: Supervised Learning Algorithms</a:t>
             </a:r>
           </a:p>
         </p:txBody>
@@ -8271,7 +8433,7 @@
           <a:p>
             <a:r>
               <a:rPr lang="en-US" sz="3200" dirty="0"/>
-              <a:t>Class-3: Supervised Learning Algorithms</a:t>
+              <a:t>Class-2: Supervised Learning Algorithms</a:t>
             </a:r>
           </a:p>
         </p:txBody>
@@ -8443,7 +8605,7 @@
           <a:p>
             <a:r>
               <a:rPr lang="en-US" sz="3200" dirty="0"/>
-              <a:t>Class-3: Supervised Learning Algorithms – Linear Regression</a:t>
+              <a:t>Class-2: Supervised Learning Algorithms – Linear Regression</a:t>
             </a:r>
           </a:p>
         </p:txBody>
@@ -8502,7 +8664,7 @@
           <a:p>
             <a:r>
               <a:rPr lang="en-US" sz="3200" dirty="0"/>
-              <a:t>Class-3: Linear Regression</a:t>
+              <a:t>Class-2: Linear Regression</a:t>
             </a:r>
           </a:p>
         </p:txBody>
@@ -9578,7 +9740,7 @@
           <a:p>
             <a:r>
               <a:rPr lang="en-US" sz="3200" dirty="0"/>
-              <a:t>Class-3: Supervised Learning Algorithms – non-linear (logistic)</a:t>
+              <a:t>Class-2: Supervised Learning Algorithms – non-linear (logistic)</a:t>
             </a:r>
           </a:p>
         </p:txBody>
@@ -9629,6 +9791,14 @@
 <file path=ppt/slides/slide3.xml><?xml version="1.0" encoding="utf-8"?>
 <p:sld xmlns:a="http://schemas.openxmlformats.org/drawingml/2006/main" xmlns:r="http://schemas.openxmlformats.org/officeDocument/2006/relationships" xmlns:p="http://schemas.openxmlformats.org/presentationml/2006/main">
   <p:cSld>
+    <p:bg>
+      <p:bgPr>
+        <a:solidFill>
+          <a:schemeClr val="bg1"/>
+        </a:solidFill>
+        <a:effectLst/>
+      </p:bgPr>
+    </p:bg>
     <p:spTree>
       <p:nvGrpSpPr>
         <p:cNvPr id="1" name=""/>
@@ -9645,6 +9815,67 @@
       </p:grpSpPr>
       <p:sp>
         <p:nvSpPr>
+          <p:cNvPr id="4" name="TextBox 3"/>
+          <p:cNvSpPr txBox="1"/>
+          <p:nvPr/>
+        </p:nvSpPr>
+        <p:spPr>
+          <a:xfrm>
+            <a:off x="648929" y="629266"/>
+            <a:ext cx="3651467" cy="1676603"/>
+          </a:xfrm>
+          <a:prstGeom prst="rect">
+            <a:avLst/>
+          </a:prstGeom>
+        </p:spPr>
+        <p:txBody>
+          <a:bodyPr vert="horz" lIns="91440" tIns="45720" rIns="91440" bIns="45720" rtlCol="0" anchor="ctr">
+            <a:normAutofit/>
+          </a:bodyPr>
+          <a:lstStyle/>
+          <a:p>
+            <a:pPr>
+              <a:lnSpc>
+                <a:spcPct val="90000"/>
+              </a:lnSpc>
+              <a:spcBef>
+                <a:spcPct val="0"/>
+              </a:spcBef>
+              <a:spcAft>
+                <a:spcPts val="600"/>
+              </a:spcAft>
+            </a:pPr>
+            <a:r>
+              <a:rPr lang="en-US" sz="3700" dirty="0">
+                <a:latin typeface="+mj-lt"/>
+                <a:ea typeface="+mj-ea"/>
+                <a:cs typeface="+mj-cs"/>
+              </a:rPr>
+              <a:t>Class-1: AI vs ML vs Deep Learning</a:t>
+            </a:r>
+          </a:p>
+          <a:p>
+            <a:pPr>
+              <a:lnSpc>
+                <a:spcPct val="90000"/>
+              </a:lnSpc>
+              <a:spcBef>
+                <a:spcPct val="0"/>
+              </a:spcBef>
+              <a:spcAft>
+                <a:spcPts val="600"/>
+              </a:spcAft>
+            </a:pPr>
+            <a:endParaRPr lang="en-US" sz="3700" dirty="0">
+              <a:latin typeface="+mj-lt"/>
+              <a:ea typeface="+mj-ea"/>
+              <a:cs typeface="+mj-cs"/>
+            </a:endParaRPr>
+          </a:p>
+        </p:txBody>
+      </p:sp>
+      <p:sp>
+        <p:nvSpPr>
           <p:cNvPr id="3" name="Subtitle 2"/>
           <p:cNvSpPr>
             <a:spLocks noGrp="1"/>
@@ -9655,193 +9886,404 @@
         </p:nvSpPr>
         <p:spPr>
           <a:xfrm>
-            <a:off x="1802100" y="963680"/>
-            <a:ext cx="8738140" cy="5721844"/>
-          </a:xfrm>
-        </p:spPr>
-        <p:txBody>
-          <a:bodyPr>
-            <a:normAutofit fontScale="40000" lnSpcReduction="20000"/>
+            <a:off x="648929" y="3731998"/>
+            <a:ext cx="5299383" cy="2714920"/>
+          </a:xfrm>
+        </p:spPr>
+        <p:txBody>
+          <a:bodyPr vert="horz" lIns="91440" tIns="45720" rIns="91440" bIns="45720" rtlCol="0">
+            <a:normAutofit/>
           </a:bodyPr>
           <a:lstStyle/>
           <a:p>
             <a:pPr algn="l"/>
             <a:r>
-              <a:rPr lang="en-US" sz="6200" b="1" dirty="0"/>
-              <a:t>Top 10 Skills</a:t>
-            </a:r>
-            <a:r>
-              <a:rPr lang="en-US" sz="6200" dirty="0"/>
-              <a:t> (in increasing ranking order)</a:t>
+              <a:rPr lang="en-US" sz="1800" dirty="0"/>
+              <a:t>1950s-1970s - AI</a:t>
+            </a:r>
+          </a:p>
+          <a:p>
+            <a:pPr indent="-228600" algn="l">
+              <a:buFont typeface="Arial" panose="020B0604020202020204" pitchFamily="34" charset="0"/>
+              <a:buChar char="•"/>
+            </a:pPr>
+            <a:r>
+              <a:rPr lang="en-US" sz="1800" dirty="0"/>
+              <a:t>Example of AI</a:t>
             </a:r>
           </a:p>
           <a:p>
             <a:pPr algn="l"/>
-            <a:endParaRPr lang="en-US" sz="6200" dirty="0"/>
-          </a:p>
-          <a:p>
-            <a:pPr marL="1600200" lvl="1" indent="-1143000" algn="l">
-              <a:buFont typeface="+mj-lt"/>
-              <a:buAutoNum type="arabicPeriod"/>
+            <a:r>
+              <a:rPr lang="en-US" sz="1800" dirty="0"/>
+              <a:t>1980s – 1990s - ML</a:t>
+            </a:r>
+          </a:p>
+          <a:p>
+            <a:pPr indent="-228600" algn="l">
+              <a:buFont typeface="Arial" panose="020B0604020202020204" pitchFamily="34" charset="0"/>
+              <a:buChar char="•"/>
             </a:pPr>
             <a:r>
-              <a:rPr lang="en-US" sz="5800" dirty="0"/>
-              <a:t>Python</a:t>
-            </a:r>
-          </a:p>
-          <a:p>
-            <a:pPr marL="1600200" lvl="1" indent="-1143000" algn="l">
-              <a:buFont typeface="+mj-lt"/>
-              <a:buAutoNum type="arabicPeriod"/>
+              <a:rPr lang="en-US" sz="1800" dirty="0"/>
+              <a:t>Example of ML (</a:t>
+            </a:r>
+            <a:r>
+              <a:rPr lang="en-US" sz="1800" b="1" dirty="0"/>
+              <a:t>“Expert” System</a:t>
+            </a:r>
+            <a:r>
+              <a:rPr lang="en-US" sz="1800" dirty="0"/>
+              <a:t>)</a:t>
+            </a:r>
+          </a:p>
+          <a:p>
+            <a:pPr algn="l"/>
+            <a:r>
+              <a:rPr lang="en-US" sz="1800" dirty="0"/>
+              <a:t>2000s -2010s – DL - ANN</a:t>
+            </a:r>
+          </a:p>
+          <a:p>
+            <a:pPr indent="-228600" algn="l">
+              <a:buFont typeface="Arial" panose="020B0604020202020204" pitchFamily="34" charset="0"/>
+              <a:buChar char="•"/>
             </a:pPr>
             <a:r>
-              <a:rPr lang="en-US" sz="5800" dirty="0"/>
-              <a:t>Linear Algebra</a:t>
-            </a:r>
-          </a:p>
-          <a:p>
-            <a:pPr marL="1600200" lvl="1" indent="-1143000" algn="l">
-              <a:buFont typeface="+mj-lt"/>
-              <a:buAutoNum type="arabicPeriod"/>
+              <a:rPr lang="en-US" sz="1800" dirty="0"/>
+              <a:t>Artificial/Deep </a:t>
+            </a:r>
+            <a:r>
+              <a:rPr lang="en-US" sz="1800" b="1" dirty="0"/>
+              <a:t>Neural Network </a:t>
+            </a:r>
+          </a:p>
+          <a:p>
+            <a:pPr indent="-228600" algn="l">
+              <a:buFont typeface="Arial" panose="020B0604020202020204" pitchFamily="34" charset="0"/>
+              <a:buChar char="•"/>
             </a:pPr>
             <a:r>
-              <a:rPr lang="en-US" sz="5800" dirty="0"/>
-              <a:t>Advance Signal Processing </a:t>
-            </a:r>
-          </a:p>
-          <a:p>
-            <a:pPr marL="1600200" lvl="1" indent="-1143000" algn="l">
-              <a:buFont typeface="+mj-lt"/>
-              <a:buAutoNum type="arabicPeriod"/>
+              <a:rPr lang="en-US" sz="1800" dirty="0"/>
+              <a:t>Example of Deep Learning</a:t>
+            </a:r>
+          </a:p>
+          <a:p>
+            <a:pPr algn="l"/>
+            <a:endParaRPr lang="en-US" sz="1800" dirty="0"/>
+          </a:p>
+          <a:p>
+            <a:pPr indent="-228600" algn="l">
+              <a:buFont typeface="Arial" panose="020B0604020202020204" pitchFamily="34" charset="0"/>
+              <a:buChar char="•"/>
             </a:pPr>
-            <a:r>
-              <a:rPr lang="en-US" sz="5800" dirty="0"/>
-              <a:t>Applied Math &amp; Algorithms</a:t>
-            </a:r>
-          </a:p>
-          <a:p>
-            <a:pPr marL="1600200" lvl="1" indent="-1143000" algn="l">
-              <a:buFont typeface="+mj-lt"/>
-              <a:buAutoNum type="arabicPeriod"/>
-            </a:pPr>
-            <a:r>
-              <a:rPr lang="en-US" sz="5800" dirty="0"/>
-              <a:t>Neural Networks Architectures</a:t>
-            </a:r>
-          </a:p>
-          <a:p>
-            <a:pPr marL="1600200" lvl="1" indent="-1143000" algn="l">
-              <a:buFont typeface="+mj-lt"/>
-              <a:buAutoNum type="arabicPeriod"/>
-            </a:pPr>
-            <a:r>
-              <a:rPr lang="en-US" sz="5800" dirty="0"/>
-              <a:t>NLP</a:t>
-            </a:r>
-          </a:p>
-          <a:p>
-            <a:pPr lvl="1" algn="l"/>
-            <a:r>
-              <a:rPr lang="en-US" sz="5800" dirty="0"/>
-              <a:t>-----------------------</a:t>
-            </a:r>
-          </a:p>
-          <a:p>
-            <a:pPr marL="1600200" lvl="1" indent="-1143000" algn="l">
-              <a:buFont typeface="+mj-lt"/>
-              <a:buAutoNum type="arabicPeriod"/>
-            </a:pPr>
-            <a:r>
-              <a:rPr lang="en-US" sz="5800" dirty="0"/>
-              <a:t>Industry Knowledge</a:t>
-            </a:r>
-          </a:p>
-          <a:p>
-            <a:pPr marL="1600200" lvl="1" indent="-1143000" algn="l">
-              <a:buFont typeface="+mj-lt"/>
-              <a:buAutoNum type="arabicPeriod"/>
-            </a:pPr>
-            <a:r>
-              <a:rPr lang="en-US" sz="5800" dirty="0"/>
-              <a:t>Effective Communication</a:t>
-            </a:r>
-          </a:p>
-          <a:p>
-            <a:pPr marL="1600200" lvl="1" indent="-1143000" algn="l">
-              <a:buFont typeface="+mj-lt"/>
-              <a:buAutoNum type="arabicPeriod"/>
-            </a:pPr>
-            <a:r>
-              <a:rPr lang="en-US" sz="5800" dirty="0"/>
-              <a:t>Rapid Prototyping</a:t>
-            </a:r>
-          </a:p>
-          <a:p>
-            <a:pPr marL="1600200" lvl="1" indent="-1143000" algn="l">
-              <a:buFont typeface="+mj-lt"/>
-              <a:buAutoNum type="arabicPeriod"/>
-            </a:pPr>
-            <a:r>
-              <a:rPr lang="en-US" sz="5800" dirty="0"/>
-              <a:t>Keep It Up/updated</a:t>
-            </a:r>
-          </a:p>
-          <a:p>
-            <a:pPr marL="1600200" lvl="1" indent="-1143000" algn="l">
-              <a:buFont typeface="+mj-lt"/>
-              <a:buAutoNum type="arabicPeriod" startAt="10"/>
-            </a:pPr>
-            <a:endParaRPr lang="en-US" sz="5400" dirty="0"/>
-          </a:p>
-          <a:p>
-            <a:pPr lvl="1" algn="l"/>
-            <a:r>
-              <a:rPr lang="en-US" sz="6200" dirty="0"/>
-              <a:t/>
-            </a:r>
-            <a:br>
-              <a:rPr lang="en-US" sz="6200" dirty="0"/>
-            </a:br>
-            <a:endParaRPr lang="en-US" sz="6200" dirty="0"/>
-          </a:p>
-        </p:txBody>
-      </p:sp>
-      <p:sp>
-        <p:nvSpPr>
-          <p:cNvPr id="4" name="TextBox 3"/>
-          <p:cNvSpPr txBox="1"/>
+            <a:endParaRPr lang="en-US" sz="1800" dirty="0"/>
+          </a:p>
+        </p:txBody>
+      </p:sp>
+      <p:pic>
+        <p:nvPicPr>
+          <p:cNvPr id="2" name="Picture 1">
+            <a:extLst>
+              <a:ext uri="{FF2B5EF4-FFF2-40B4-BE49-F238E27FC236}">
+                <a16:creationId xmlns:a16="http://schemas.microsoft.com/office/drawing/2014/main" id="{BA5AF337-9A07-4F1F-B422-F537DB28C43D}"/>
+              </a:ext>
+            </a:extLst>
+          </p:cNvPr>
+          <p:cNvPicPr>
+            <a:picLocks noChangeAspect="1"/>
+          </p:cNvPicPr>
           <p:nvPr/>
-        </p:nvSpPr>
-        <p:spPr>
-          <a:xfrm>
-            <a:off x="95429" y="101906"/>
-            <a:ext cx="5644109" cy="861774"/>
+        </p:nvPicPr>
+        <p:blipFill rotWithShape="1">
+          <a:blip r:embed="rId3"/>
+          <a:srcRect l="3932" r="3557" b="2"/>
+          <a:stretch/>
+        </p:blipFill>
+        <p:spPr>
+          <a:xfrm>
+            <a:off x="6237551" y="793940"/>
+            <a:ext cx="5892776" cy="5429416"/>
           </a:xfrm>
           <a:prstGeom prst="rect">
             <a:avLst/>
           </a:prstGeom>
-          <a:noFill/>
-        </p:spPr>
-        <p:txBody>
-          <a:bodyPr wrap="none" rtlCol="0">
-            <a:spAutoFit/>
+          <a:effectLst/>
+        </p:spPr>
+      </p:pic>
+      <p:sp>
+        <p:nvSpPr>
+          <p:cNvPr id="5" name="Subtitle 2">
+            <a:extLst>
+              <a:ext uri="{FF2B5EF4-FFF2-40B4-BE49-F238E27FC236}">
+                <a16:creationId xmlns:a16="http://schemas.microsoft.com/office/drawing/2014/main" id="{D9929E9D-FEC5-4EAC-9822-EC63839F7969}"/>
+              </a:ext>
+            </a:extLst>
+          </p:cNvPr>
+          <p:cNvSpPr txBox="1">
+            <a:spLocks/>
+          </p:cNvSpPr>
+          <p:nvPr/>
+        </p:nvSpPr>
+        <p:spPr>
+          <a:xfrm>
+            <a:off x="693271" y="1999128"/>
+            <a:ext cx="5110705" cy="1866539"/>
+          </a:xfrm>
+          <a:prstGeom prst="rect">
+            <a:avLst/>
+          </a:prstGeom>
+        </p:spPr>
+        <p:txBody>
+          <a:bodyPr vert="horz" lIns="91440" tIns="45720" rIns="91440" bIns="45720" rtlCol="0">
+            <a:normAutofit/>
           </a:bodyPr>
-          <a:lstStyle/>
-          <a:p>
-            <a:r>
-              <a:rPr lang="en-US" sz="3200" dirty="0"/>
-              <a:t>Who is a ML Engineer/Scientist? </a:t>
-            </a:r>
-          </a:p>
-          <a:p>
-            <a:endParaRPr lang="en-US" dirty="0"/>
+          <a:lstStyle>
+            <a:lvl1pPr marL="0" indent="0" algn="ctr" defTabSz="914400" rtl="0" eaLnBrk="1" latinLnBrk="0" hangingPunct="1">
+              <a:lnSpc>
+                <a:spcPct val="90000"/>
+              </a:lnSpc>
+              <a:spcBef>
+                <a:spcPts val="1000"/>
+              </a:spcBef>
+              <a:buFont typeface="Arial" panose="020B0604020202020204" pitchFamily="34" charset="0"/>
+              <a:buNone/>
+              <a:defRPr sz="2400" kern="1200">
+                <a:solidFill>
+                  <a:schemeClr val="tx1"/>
+                </a:solidFill>
+                <a:latin typeface="+mn-lt"/>
+                <a:ea typeface="+mn-ea"/>
+                <a:cs typeface="+mn-cs"/>
+              </a:defRPr>
+            </a:lvl1pPr>
+            <a:lvl2pPr marL="457200" indent="0" algn="ctr" defTabSz="914400" rtl="0" eaLnBrk="1" latinLnBrk="0" hangingPunct="1">
+              <a:lnSpc>
+                <a:spcPct val="90000"/>
+              </a:lnSpc>
+              <a:spcBef>
+                <a:spcPts val="500"/>
+              </a:spcBef>
+              <a:buFont typeface="Arial" panose="020B0604020202020204" pitchFamily="34" charset="0"/>
+              <a:buNone/>
+              <a:defRPr sz="2000" kern="1200">
+                <a:solidFill>
+                  <a:schemeClr val="tx1"/>
+                </a:solidFill>
+                <a:latin typeface="+mn-lt"/>
+                <a:ea typeface="+mn-ea"/>
+                <a:cs typeface="+mn-cs"/>
+              </a:defRPr>
+            </a:lvl2pPr>
+            <a:lvl3pPr marL="914400" indent="0" algn="ctr" defTabSz="914400" rtl="0" eaLnBrk="1" latinLnBrk="0" hangingPunct="1">
+              <a:lnSpc>
+                <a:spcPct val="90000"/>
+              </a:lnSpc>
+              <a:spcBef>
+                <a:spcPts val="500"/>
+              </a:spcBef>
+              <a:buFont typeface="Arial" panose="020B0604020202020204" pitchFamily="34" charset="0"/>
+              <a:buNone/>
+              <a:defRPr sz="1800" kern="1200">
+                <a:solidFill>
+                  <a:schemeClr val="tx1"/>
+                </a:solidFill>
+                <a:latin typeface="+mn-lt"/>
+                <a:ea typeface="+mn-ea"/>
+                <a:cs typeface="+mn-cs"/>
+              </a:defRPr>
+            </a:lvl3pPr>
+            <a:lvl4pPr marL="1371600" indent="0" algn="ctr" defTabSz="914400" rtl="0" eaLnBrk="1" latinLnBrk="0" hangingPunct="1">
+              <a:lnSpc>
+                <a:spcPct val="90000"/>
+              </a:lnSpc>
+              <a:spcBef>
+                <a:spcPts val="500"/>
+              </a:spcBef>
+              <a:buFont typeface="Arial" panose="020B0604020202020204" pitchFamily="34" charset="0"/>
+              <a:buNone/>
+              <a:defRPr sz="1600" kern="1200">
+                <a:solidFill>
+                  <a:schemeClr val="tx1"/>
+                </a:solidFill>
+                <a:latin typeface="+mn-lt"/>
+                <a:ea typeface="+mn-ea"/>
+                <a:cs typeface="+mn-cs"/>
+              </a:defRPr>
+            </a:lvl4pPr>
+            <a:lvl5pPr marL="1828800" indent="0" algn="ctr" defTabSz="914400" rtl="0" eaLnBrk="1" latinLnBrk="0" hangingPunct="1">
+              <a:lnSpc>
+                <a:spcPct val="90000"/>
+              </a:lnSpc>
+              <a:spcBef>
+                <a:spcPts val="500"/>
+              </a:spcBef>
+              <a:buFont typeface="Arial" panose="020B0604020202020204" pitchFamily="34" charset="0"/>
+              <a:buNone/>
+              <a:defRPr sz="1600" kern="1200">
+                <a:solidFill>
+                  <a:schemeClr val="tx1"/>
+                </a:solidFill>
+                <a:latin typeface="+mn-lt"/>
+                <a:ea typeface="+mn-ea"/>
+                <a:cs typeface="+mn-cs"/>
+              </a:defRPr>
+            </a:lvl5pPr>
+            <a:lvl6pPr marL="2286000" indent="0" algn="ctr" defTabSz="914400" rtl="0" eaLnBrk="1" latinLnBrk="0" hangingPunct="1">
+              <a:lnSpc>
+                <a:spcPct val="90000"/>
+              </a:lnSpc>
+              <a:spcBef>
+                <a:spcPts val="500"/>
+              </a:spcBef>
+              <a:buFont typeface="Arial" panose="020B0604020202020204" pitchFamily="34" charset="0"/>
+              <a:buNone/>
+              <a:defRPr sz="1600" kern="1200">
+                <a:solidFill>
+                  <a:schemeClr val="tx1"/>
+                </a:solidFill>
+                <a:latin typeface="+mn-lt"/>
+                <a:ea typeface="+mn-ea"/>
+                <a:cs typeface="+mn-cs"/>
+              </a:defRPr>
+            </a:lvl6pPr>
+            <a:lvl7pPr marL="2743200" indent="0" algn="ctr" defTabSz="914400" rtl="0" eaLnBrk="1" latinLnBrk="0" hangingPunct="1">
+              <a:lnSpc>
+                <a:spcPct val="90000"/>
+              </a:lnSpc>
+              <a:spcBef>
+                <a:spcPts val="500"/>
+              </a:spcBef>
+              <a:buFont typeface="Arial" panose="020B0604020202020204" pitchFamily="34" charset="0"/>
+              <a:buNone/>
+              <a:defRPr sz="1600" kern="1200">
+                <a:solidFill>
+                  <a:schemeClr val="tx1"/>
+                </a:solidFill>
+                <a:latin typeface="+mn-lt"/>
+                <a:ea typeface="+mn-ea"/>
+                <a:cs typeface="+mn-cs"/>
+              </a:defRPr>
+            </a:lvl7pPr>
+            <a:lvl8pPr marL="3200400" indent="0" algn="ctr" defTabSz="914400" rtl="0" eaLnBrk="1" latinLnBrk="0" hangingPunct="1">
+              <a:lnSpc>
+                <a:spcPct val="90000"/>
+              </a:lnSpc>
+              <a:spcBef>
+                <a:spcPts val="500"/>
+              </a:spcBef>
+              <a:buFont typeface="Arial" panose="020B0604020202020204" pitchFamily="34" charset="0"/>
+              <a:buNone/>
+              <a:defRPr sz="1600" kern="1200">
+                <a:solidFill>
+                  <a:schemeClr val="tx1"/>
+                </a:solidFill>
+                <a:latin typeface="+mn-lt"/>
+                <a:ea typeface="+mn-ea"/>
+                <a:cs typeface="+mn-cs"/>
+              </a:defRPr>
+            </a:lvl8pPr>
+            <a:lvl9pPr marL="3657600" indent="0" algn="ctr" defTabSz="914400" rtl="0" eaLnBrk="1" latinLnBrk="0" hangingPunct="1">
+              <a:lnSpc>
+                <a:spcPct val="90000"/>
+              </a:lnSpc>
+              <a:spcBef>
+                <a:spcPts val="500"/>
+              </a:spcBef>
+              <a:buFont typeface="Arial" panose="020B0604020202020204" pitchFamily="34" charset="0"/>
+              <a:buNone/>
+              <a:defRPr sz="1600" kern="1200">
+                <a:solidFill>
+                  <a:schemeClr val="tx1"/>
+                </a:solidFill>
+                <a:latin typeface="+mn-lt"/>
+                <a:ea typeface="+mn-ea"/>
+                <a:cs typeface="+mn-cs"/>
+              </a:defRPr>
+            </a:lvl9pPr>
+          </a:lstStyle>
+          <a:p>
+            <a:pPr algn="l"/>
+            <a:r>
+              <a:rPr lang="en-US" sz="1800" dirty="0"/>
+              <a:t>WHAT IS AI?</a:t>
+            </a:r>
+          </a:p>
+          <a:p>
+            <a:pPr algn="l"/>
+            <a:r>
+              <a:rPr lang="en-US" sz="1800" dirty="0"/>
+              <a:t>“</a:t>
+            </a:r>
+            <a:r>
+              <a:rPr lang="en-US" sz="1800" b="1" dirty="0"/>
+              <a:t>Algorithms</a:t>
+            </a:r>
+            <a:r>
+              <a:rPr lang="en-US" sz="1800" dirty="0"/>
+              <a:t> enabled by </a:t>
+            </a:r>
+            <a:r>
+              <a:rPr lang="en-US" sz="1800" b="1" dirty="0"/>
+              <a:t>constraints</a:t>
+            </a:r>
+            <a:r>
+              <a:rPr lang="en-US" sz="1800" dirty="0"/>
+              <a:t> &amp; exposed by </a:t>
+            </a:r>
+            <a:r>
+              <a:rPr lang="en-US" sz="1800" b="1" dirty="0"/>
+              <a:t>representations</a:t>
+            </a:r>
+            <a:r>
+              <a:rPr lang="en-US" sz="1800" dirty="0"/>
+              <a:t> that support models targeted at </a:t>
+            </a:r>
+            <a:r>
+              <a:rPr lang="en-US" sz="1800" b="1" dirty="0"/>
+              <a:t>thinking</a:t>
+            </a:r>
+            <a:r>
+              <a:rPr lang="en-US" sz="1800" dirty="0"/>
+              <a:t>, </a:t>
+            </a:r>
+            <a:r>
+              <a:rPr lang="en-US" sz="1800" b="1" dirty="0"/>
+              <a:t>perception</a:t>
+            </a:r>
+            <a:r>
+              <a:rPr lang="en-US" sz="1800" dirty="0"/>
+              <a:t> and </a:t>
+            </a:r>
+            <a:r>
+              <a:rPr lang="en-US" sz="1800" b="1" dirty="0"/>
+              <a:t>action</a:t>
+            </a:r>
+            <a:r>
+              <a:rPr lang="en-US" sz="1800" dirty="0"/>
+              <a:t>.” 	</a:t>
+            </a:r>
+          </a:p>
+          <a:p>
+            <a:pPr algn="r"/>
+            <a:r>
+              <a:rPr lang="en-US" sz="1800" dirty="0"/>
+              <a:t>MIT Prof. Patrick Winston</a:t>
+            </a:r>
+          </a:p>
+          <a:p>
+            <a:pPr indent="-228600" algn="l">
+              <a:buFont typeface="Arial" panose="020B0604020202020204" pitchFamily="34" charset="0"/>
+              <a:buChar char="•"/>
+            </a:pPr>
+            <a:endParaRPr lang="en-US" sz="1800" dirty="0"/>
           </a:p>
         </p:txBody>
       </p:sp>
     </p:spTree>
     <p:extLst>
       <p:ext uri="{BB962C8B-B14F-4D97-AF65-F5344CB8AC3E}">
-        <p14:creationId xmlns:p14="http://schemas.microsoft.com/office/powerpoint/2010/main" val="728681631"/>
+        <p14:creationId xmlns:p14="http://schemas.microsoft.com/office/powerpoint/2010/main" val="2618803147"/>
       </p:ext>
     </p:extLst>
   </p:cSld>
@@ -9922,7 +10364,7 @@
           <a:p>
             <a:r>
               <a:rPr lang="en-US" sz="3200" dirty="0"/>
-              <a:t>Class-3: Logistic Regression Equation</a:t>
+              <a:t>Class-2: Logistic Regression Equation</a:t>
             </a:r>
           </a:p>
         </p:txBody>
@@ -10413,7 +10855,7 @@
           <a:p>
             <a:r>
               <a:rPr lang="en-US" sz="3200" dirty="0"/>
-              <a:t>Class-3: Linear Regression </a:t>
+              <a:t>Class-2: Linear Regression </a:t>
             </a:r>
           </a:p>
         </p:txBody>
@@ -10911,7 +11353,7 @@
           <a:p>
             <a:r>
               <a:rPr lang="en-US" sz="3200" dirty="0"/>
-              <a:t>Class-3: Logistic Regression Use Cases</a:t>
+              <a:t>Class-2: Logistic Regression Use Cases</a:t>
             </a:r>
           </a:p>
         </p:txBody>
@@ -11347,10 +11789,6 @@
           </a:p>
           <a:p>
             <a:pPr algn="l"/>
-            <a:r>
-              <a:rPr lang="en-US" sz="6600" dirty="0"/>
-              <a:t/>
-            </a:r>
             <a:br>
               <a:rPr lang="en-US" sz="6600" dirty="0"/>
             </a:br>
@@ -11499,10 +11937,6 @@
           </a:p>
           <a:p>
             <a:pPr algn="l"/>
-            <a:r>
-              <a:rPr lang="en-US" sz="6600" dirty="0"/>
-              <a:t/>
-            </a:r>
             <a:br>
               <a:rPr lang="en-US" sz="6600" dirty="0"/>
             </a:br>
@@ -11602,23 +12036,29 @@
           </a:p>
           <a:p>
             <a:pPr algn="l"/>
-            <a:r>
-              <a:rPr lang="en-US" sz="6200" dirty="0"/>
-              <a:t>Machine Learning Projects </a:t>
-            </a:r>
-          </a:p>
-        </p:txBody>
-      </p:sp>
-      <p:sp>
-        <p:nvSpPr>
-          <p:cNvPr id="4" name="TextBox 3"/>
+            <a:br>
+              <a:rPr lang="en-US" sz="6600" dirty="0"/>
+            </a:br>
+            <a:endParaRPr lang="en-US" sz="6600" dirty="0"/>
+          </a:p>
+        </p:txBody>
+      </p:sp>
+      <p:sp>
+        <p:nvSpPr>
+          <p:cNvPr id="5" name="TextBox 4">
+            <a:extLst>
+              <a:ext uri="{FF2B5EF4-FFF2-40B4-BE49-F238E27FC236}">
+                <a16:creationId xmlns:a16="http://schemas.microsoft.com/office/drawing/2014/main" id="{3F9B5E2A-82D8-4F44-B8DD-1CBB90D9EE82}"/>
+              </a:ext>
+            </a:extLst>
+          </p:cNvPr>
           <p:cNvSpPr txBox="1"/>
           <p:nvPr/>
         </p:nvSpPr>
         <p:spPr>
           <a:xfrm>
-            <a:off x="522514" y="217714"/>
-            <a:ext cx="936154" cy="369332"/>
+            <a:off x="254568" y="147547"/>
+            <a:ext cx="10968760" cy="584775"/>
           </a:xfrm>
           <a:prstGeom prst="rect">
             <a:avLst/>
@@ -11626,14 +12066,14 @@
           <a:noFill/>
         </p:spPr>
         <p:txBody>
-          <a:bodyPr wrap="none" rtlCol="0">
+          <a:bodyPr wrap="square" rtlCol="0">
             <a:spAutoFit/>
           </a:bodyPr>
           <a:lstStyle/>
           <a:p>
             <a:r>
-              <a:rPr lang="en-US" dirty="0"/>
-              <a:t>Content</a:t>
+              <a:rPr lang="en-US" sz="3200" dirty="0"/>
+              <a:t>Class-3: Neural Network Intro</a:t>
             </a:r>
           </a:p>
         </p:txBody>
@@ -11641,7 +12081,7 @@
     </p:spTree>
     <p:extLst>
       <p:ext uri="{BB962C8B-B14F-4D97-AF65-F5344CB8AC3E}">
-        <p14:creationId xmlns:p14="http://schemas.microsoft.com/office/powerpoint/2010/main" val="2764468633"/>
+        <p14:creationId xmlns:p14="http://schemas.microsoft.com/office/powerpoint/2010/main" val="2144802336"/>
       </p:ext>
     </p:extLst>
   </p:cSld>
@@ -11680,6 +12120,99 @@
         </p:nvSpPr>
         <p:spPr>
           <a:xfrm>
+            <a:off x="1166948" y="815294"/>
+            <a:ext cx="9144000" cy="5498419"/>
+          </a:xfrm>
+        </p:spPr>
+        <p:txBody>
+          <a:bodyPr>
+            <a:normAutofit/>
+          </a:bodyPr>
+          <a:lstStyle/>
+          <a:p>
+            <a:pPr algn="l"/>
+            <a:endParaRPr lang="en-US" sz="6200" dirty="0"/>
+          </a:p>
+          <a:p>
+            <a:pPr algn="l"/>
+            <a:r>
+              <a:rPr lang="en-US" sz="6200" dirty="0"/>
+              <a:t>Machine Learning Projects </a:t>
+            </a:r>
+          </a:p>
+        </p:txBody>
+      </p:sp>
+      <p:sp>
+        <p:nvSpPr>
+          <p:cNvPr id="4" name="TextBox 3"/>
+          <p:cNvSpPr txBox="1"/>
+          <p:nvPr/>
+        </p:nvSpPr>
+        <p:spPr>
+          <a:xfrm>
+            <a:off x="522514" y="217714"/>
+            <a:ext cx="936154" cy="369332"/>
+          </a:xfrm>
+          <a:prstGeom prst="rect">
+            <a:avLst/>
+          </a:prstGeom>
+          <a:noFill/>
+        </p:spPr>
+        <p:txBody>
+          <a:bodyPr wrap="none" rtlCol="0">
+            <a:spAutoFit/>
+          </a:bodyPr>
+          <a:lstStyle/>
+          <a:p>
+            <a:r>
+              <a:rPr lang="en-US" dirty="0"/>
+              <a:t>Content</a:t>
+            </a:r>
+          </a:p>
+        </p:txBody>
+      </p:sp>
+    </p:spTree>
+    <p:extLst>
+      <p:ext uri="{BB962C8B-B14F-4D97-AF65-F5344CB8AC3E}">
+        <p14:creationId xmlns:p14="http://schemas.microsoft.com/office/powerpoint/2010/main" val="2764468633"/>
+      </p:ext>
+    </p:extLst>
+  </p:cSld>
+  <p:clrMapOvr>
+    <a:masterClrMapping/>
+  </p:clrMapOvr>
+</p:sld>
+</file>
+
+<file path=ppt/slides/slide39.xml><?xml version="1.0" encoding="utf-8"?>
+<p:sld xmlns:a="http://schemas.openxmlformats.org/drawingml/2006/main" xmlns:r="http://schemas.openxmlformats.org/officeDocument/2006/relationships" xmlns:p="http://schemas.openxmlformats.org/presentationml/2006/main">
+  <p:cSld>
+    <p:spTree>
+      <p:nvGrpSpPr>
+        <p:cNvPr id="1" name=""/>
+        <p:cNvGrpSpPr/>
+        <p:nvPr/>
+      </p:nvGrpSpPr>
+      <p:grpSpPr>
+        <a:xfrm>
+          <a:off x="0" y="0"/>
+          <a:ext cx="0" cy="0"/>
+          <a:chOff x="0" y="0"/>
+          <a:chExt cx="0" cy="0"/>
+        </a:xfrm>
+      </p:grpSpPr>
+      <p:sp>
+        <p:nvSpPr>
+          <p:cNvPr id="3" name="Subtitle 2"/>
+          <p:cNvSpPr>
+            <a:spLocks noGrp="1"/>
+          </p:cNvSpPr>
+          <p:nvPr>
+            <p:ph type="subTitle" idx="1"/>
+          </p:nvPr>
+        </p:nvSpPr>
+        <p:spPr>
+          <a:xfrm>
             <a:off x="1166948" y="731520"/>
             <a:ext cx="10059070" cy="5582193"/>
           </a:xfrm>
@@ -11807,7 +12340,97 @@
 </p:sld>
 </file>
 
-<file path=ppt/slides/slide39.xml><?xml version="1.0" encoding="utf-8"?>
+<file path=ppt/slides/slide4.xml><?xml version="1.0" encoding="utf-8"?>
+<p:sld xmlns:a="http://schemas.openxmlformats.org/drawingml/2006/main" xmlns:r="http://schemas.openxmlformats.org/officeDocument/2006/relationships" xmlns:p="http://schemas.openxmlformats.org/presentationml/2006/main">
+  <p:cSld>
+    <p:spTree>
+      <p:nvGrpSpPr>
+        <p:cNvPr id="1" name=""/>
+        <p:cNvGrpSpPr/>
+        <p:nvPr/>
+      </p:nvGrpSpPr>
+      <p:grpSpPr>
+        <a:xfrm>
+          <a:off x="0" y="0"/>
+          <a:ext cx="0" cy="0"/>
+          <a:chOff x="0" y="0"/>
+          <a:chExt cx="0" cy="0"/>
+        </a:xfrm>
+      </p:grpSpPr>
+      <p:sp>
+        <p:nvSpPr>
+          <p:cNvPr id="5" name="Subtitle 4">
+            <a:extLst>
+              <a:ext uri="{FF2B5EF4-FFF2-40B4-BE49-F238E27FC236}">
+                <a16:creationId xmlns:a16="http://schemas.microsoft.com/office/drawing/2014/main" id="{3956E86E-30CF-45A6-BB20-CCDE1F98460E}"/>
+              </a:ext>
+            </a:extLst>
+          </p:cNvPr>
+          <p:cNvSpPr>
+            <a:spLocks noGrp="1"/>
+          </p:cNvSpPr>
+          <p:nvPr>
+            <p:ph type="subTitle" idx="1"/>
+          </p:nvPr>
+        </p:nvSpPr>
+        <p:spPr>
+          <a:xfrm>
+            <a:off x="1524000" y="3602038"/>
+            <a:ext cx="9144000" cy="1655762"/>
+          </a:xfrm>
+        </p:spPr>
+        <p:txBody>
+          <a:bodyPr/>
+          <a:lstStyle/>
+          <a:p>
+            <a:endParaRPr lang="en-US"/>
+          </a:p>
+        </p:txBody>
+      </p:sp>
+      <p:pic>
+        <p:nvPicPr>
+          <p:cNvPr id="6" name="Picture 5">
+            <a:extLst>
+              <a:ext uri="{FF2B5EF4-FFF2-40B4-BE49-F238E27FC236}">
+                <a16:creationId xmlns:a16="http://schemas.microsoft.com/office/drawing/2014/main" id="{0FD10501-A78B-4675-A1CA-259C04828DE1}"/>
+              </a:ext>
+            </a:extLst>
+          </p:cNvPr>
+          <p:cNvPicPr>
+            <a:picLocks noChangeAspect="1"/>
+          </p:cNvPicPr>
+          <p:nvPr/>
+        </p:nvPicPr>
+        <p:blipFill>
+          <a:blip r:embed="rId2"/>
+          <a:stretch>
+            <a:fillRect/>
+          </a:stretch>
+        </p:blipFill>
+        <p:spPr>
+          <a:xfrm>
+            <a:off x="0" y="123446"/>
+            <a:ext cx="12192000" cy="6611107"/>
+          </a:xfrm>
+          <a:prstGeom prst="rect">
+            <a:avLst/>
+          </a:prstGeom>
+        </p:spPr>
+      </p:pic>
+    </p:spTree>
+    <p:extLst>
+      <p:ext uri="{BB962C8B-B14F-4D97-AF65-F5344CB8AC3E}">
+        <p14:creationId xmlns:p14="http://schemas.microsoft.com/office/powerpoint/2010/main" val="3230676015"/>
+      </p:ext>
+    </p:extLst>
+  </p:cSld>
+  <p:clrMapOvr>
+    <a:masterClrMapping/>
+  </p:clrMapOvr>
+</p:sld>
+</file>
+
+<file path=ppt/slides/slide40.xml><?xml version="1.0" encoding="utf-8"?>
 <p:sld xmlns:a="http://schemas.openxmlformats.org/drawingml/2006/main" xmlns:r="http://schemas.openxmlformats.org/officeDocument/2006/relationships" xmlns:p="http://schemas.openxmlformats.org/presentationml/2006/main">
   <p:cSld>
     <p:spTree>
@@ -12405,538 +13028,7 @@
 </p:sld>
 </file>
 
-<file path=ppt/slides/slide4.xml><?xml version="1.0" encoding="utf-8"?>
-<p:sld xmlns:a="http://schemas.openxmlformats.org/drawingml/2006/main" xmlns:r="http://schemas.openxmlformats.org/officeDocument/2006/relationships" xmlns:p="http://schemas.openxmlformats.org/presentationml/2006/main">
-  <p:cSld>
-    <p:bg>
-      <p:bgPr>
-        <a:solidFill>
-          <a:schemeClr val="bg1"/>
-        </a:solidFill>
-        <a:effectLst/>
-      </p:bgPr>
-    </p:bg>
-    <p:spTree>
-      <p:nvGrpSpPr>
-        <p:cNvPr id="1" name=""/>
-        <p:cNvGrpSpPr/>
-        <p:nvPr/>
-      </p:nvGrpSpPr>
-      <p:grpSpPr>
-        <a:xfrm>
-          <a:off x="0" y="0"/>
-          <a:ext cx="0" cy="0"/>
-          <a:chOff x="0" y="0"/>
-          <a:chExt cx="0" cy="0"/>
-        </a:xfrm>
-      </p:grpSpPr>
-      <p:sp>
-        <p:nvSpPr>
-          <p:cNvPr id="4" name="TextBox 3"/>
-          <p:cNvSpPr txBox="1"/>
-          <p:nvPr/>
-        </p:nvSpPr>
-        <p:spPr>
-          <a:xfrm>
-            <a:off x="648929" y="629266"/>
-            <a:ext cx="3651467" cy="1676603"/>
-          </a:xfrm>
-          <a:prstGeom prst="rect">
-            <a:avLst/>
-          </a:prstGeom>
-        </p:spPr>
-        <p:txBody>
-          <a:bodyPr vert="horz" lIns="91440" tIns="45720" rIns="91440" bIns="45720" rtlCol="0" anchor="ctr">
-            <a:normAutofit/>
-          </a:bodyPr>
-          <a:lstStyle/>
-          <a:p>
-            <a:pPr>
-              <a:lnSpc>
-                <a:spcPct val="90000"/>
-              </a:lnSpc>
-              <a:spcBef>
-                <a:spcPct val="0"/>
-              </a:spcBef>
-              <a:spcAft>
-                <a:spcPts val="600"/>
-              </a:spcAft>
-            </a:pPr>
-            <a:r>
-              <a:rPr lang="en-US" sz="3700" dirty="0">
-                <a:latin typeface="+mj-lt"/>
-                <a:ea typeface="+mj-ea"/>
-                <a:cs typeface="+mj-cs"/>
-              </a:rPr>
-              <a:t>Class-1: AI vs ML vs Deep Learning</a:t>
-            </a:r>
-          </a:p>
-          <a:p>
-            <a:pPr>
-              <a:lnSpc>
-                <a:spcPct val="90000"/>
-              </a:lnSpc>
-              <a:spcBef>
-                <a:spcPct val="0"/>
-              </a:spcBef>
-              <a:spcAft>
-                <a:spcPts val="600"/>
-              </a:spcAft>
-            </a:pPr>
-            <a:endParaRPr lang="en-US" sz="3700" dirty="0">
-              <a:latin typeface="+mj-lt"/>
-              <a:ea typeface="+mj-ea"/>
-              <a:cs typeface="+mj-cs"/>
-            </a:endParaRPr>
-          </a:p>
-        </p:txBody>
-      </p:sp>
-      <p:sp>
-        <p:nvSpPr>
-          <p:cNvPr id="3" name="Subtitle 2"/>
-          <p:cNvSpPr>
-            <a:spLocks noGrp="1"/>
-          </p:cNvSpPr>
-          <p:nvPr>
-            <p:ph type="subTitle" idx="1"/>
-          </p:nvPr>
-        </p:nvSpPr>
-        <p:spPr>
-          <a:xfrm>
-            <a:off x="648929" y="3731998"/>
-            <a:ext cx="5299383" cy="2714920"/>
-          </a:xfrm>
-        </p:spPr>
-        <p:txBody>
-          <a:bodyPr vert="horz" lIns="91440" tIns="45720" rIns="91440" bIns="45720" rtlCol="0">
-            <a:normAutofit/>
-          </a:bodyPr>
-          <a:lstStyle/>
-          <a:p>
-            <a:pPr algn="l"/>
-            <a:r>
-              <a:rPr lang="en-US" sz="1800" dirty="0"/>
-              <a:t>1950s-1970s - AI</a:t>
-            </a:r>
-          </a:p>
-          <a:p>
-            <a:pPr indent="-228600" algn="l">
-              <a:buFont typeface="Arial" panose="020B0604020202020204" pitchFamily="34" charset="0"/>
-              <a:buChar char="•"/>
-            </a:pPr>
-            <a:r>
-              <a:rPr lang="en-US" sz="1800" dirty="0"/>
-              <a:t>Example of AI</a:t>
-            </a:r>
-          </a:p>
-          <a:p>
-            <a:pPr algn="l"/>
-            <a:r>
-              <a:rPr lang="en-US" sz="1800" dirty="0"/>
-              <a:t>1980s – 1990s - ML</a:t>
-            </a:r>
-          </a:p>
-          <a:p>
-            <a:pPr indent="-228600" algn="l">
-              <a:buFont typeface="Arial" panose="020B0604020202020204" pitchFamily="34" charset="0"/>
-              <a:buChar char="•"/>
-            </a:pPr>
-            <a:r>
-              <a:rPr lang="en-US" sz="1800" dirty="0"/>
-              <a:t>Example of ML (“Expert” System)</a:t>
-            </a:r>
-          </a:p>
-          <a:p>
-            <a:pPr algn="l"/>
-            <a:r>
-              <a:rPr lang="en-US" sz="1800" dirty="0"/>
-              <a:t>2000s -2010s – DL - ANN</a:t>
-            </a:r>
-          </a:p>
-          <a:p>
-            <a:pPr indent="-228600" algn="l">
-              <a:buFont typeface="Arial" panose="020B0604020202020204" pitchFamily="34" charset="0"/>
-              <a:buChar char="•"/>
-            </a:pPr>
-            <a:r>
-              <a:rPr lang="en-US" sz="1800" dirty="0"/>
-              <a:t>Artificial/Deep Neural Network </a:t>
-            </a:r>
-          </a:p>
-          <a:p>
-            <a:pPr indent="-228600" algn="l">
-              <a:buFont typeface="Arial" panose="020B0604020202020204" pitchFamily="34" charset="0"/>
-              <a:buChar char="•"/>
-            </a:pPr>
-            <a:r>
-              <a:rPr lang="en-US" sz="1800" dirty="0"/>
-              <a:t>Example of Deep Learning</a:t>
-            </a:r>
-          </a:p>
-          <a:p>
-            <a:pPr algn="l"/>
-            <a:endParaRPr lang="en-US" sz="1800" dirty="0"/>
-          </a:p>
-          <a:p>
-            <a:pPr indent="-228600" algn="l">
-              <a:buFont typeface="Arial" panose="020B0604020202020204" pitchFamily="34" charset="0"/>
-              <a:buChar char="•"/>
-            </a:pPr>
-            <a:endParaRPr lang="en-US" sz="1800" dirty="0"/>
-          </a:p>
-        </p:txBody>
-      </p:sp>
-      <p:pic>
-        <p:nvPicPr>
-          <p:cNvPr id="2" name="Picture 1">
-            <a:extLst>
-              <a:ext uri="{FF2B5EF4-FFF2-40B4-BE49-F238E27FC236}">
-                <a16:creationId xmlns:a16="http://schemas.microsoft.com/office/drawing/2014/main" id="{BA5AF337-9A07-4F1F-B422-F537DB28C43D}"/>
-              </a:ext>
-            </a:extLst>
-          </p:cNvPr>
-          <p:cNvPicPr>
-            <a:picLocks noChangeAspect="1"/>
-          </p:cNvPicPr>
-          <p:nvPr/>
-        </p:nvPicPr>
-        <p:blipFill rotWithShape="1">
-          <a:blip r:embed="rId3"/>
-          <a:srcRect l="3932" r="3557" b="2"/>
-          <a:stretch/>
-        </p:blipFill>
-        <p:spPr>
-          <a:xfrm>
-            <a:off x="6237551" y="793940"/>
-            <a:ext cx="5892776" cy="5429416"/>
-          </a:xfrm>
-          <a:prstGeom prst="rect">
-            <a:avLst/>
-          </a:prstGeom>
-          <a:effectLst/>
-        </p:spPr>
-      </p:pic>
-      <p:sp>
-        <p:nvSpPr>
-          <p:cNvPr id="5" name="Subtitle 2">
-            <a:extLst>
-              <a:ext uri="{FF2B5EF4-FFF2-40B4-BE49-F238E27FC236}">
-                <a16:creationId xmlns:a16="http://schemas.microsoft.com/office/drawing/2014/main" id="{D9929E9D-FEC5-4EAC-9822-EC63839F7969}"/>
-              </a:ext>
-            </a:extLst>
-          </p:cNvPr>
-          <p:cNvSpPr txBox="1">
-            <a:spLocks/>
-          </p:cNvSpPr>
-          <p:nvPr/>
-        </p:nvSpPr>
-        <p:spPr>
-          <a:xfrm>
-            <a:off x="693271" y="1999128"/>
-            <a:ext cx="5110705" cy="1866539"/>
-          </a:xfrm>
-          <a:prstGeom prst="rect">
-            <a:avLst/>
-          </a:prstGeom>
-        </p:spPr>
-        <p:txBody>
-          <a:bodyPr vert="horz" lIns="91440" tIns="45720" rIns="91440" bIns="45720" rtlCol="0">
-            <a:normAutofit/>
-          </a:bodyPr>
-          <a:lstStyle>
-            <a:lvl1pPr marL="0" indent="0" algn="ctr" defTabSz="914400" rtl="0" eaLnBrk="1" latinLnBrk="0" hangingPunct="1">
-              <a:lnSpc>
-                <a:spcPct val="90000"/>
-              </a:lnSpc>
-              <a:spcBef>
-                <a:spcPts val="1000"/>
-              </a:spcBef>
-              <a:buFont typeface="Arial" panose="020B0604020202020204" pitchFamily="34" charset="0"/>
-              <a:buNone/>
-              <a:defRPr sz="2400" kern="1200">
-                <a:solidFill>
-                  <a:schemeClr val="tx1"/>
-                </a:solidFill>
-                <a:latin typeface="+mn-lt"/>
-                <a:ea typeface="+mn-ea"/>
-                <a:cs typeface="+mn-cs"/>
-              </a:defRPr>
-            </a:lvl1pPr>
-            <a:lvl2pPr marL="457200" indent="0" algn="ctr" defTabSz="914400" rtl="0" eaLnBrk="1" latinLnBrk="0" hangingPunct="1">
-              <a:lnSpc>
-                <a:spcPct val="90000"/>
-              </a:lnSpc>
-              <a:spcBef>
-                <a:spcPts val="500"/>
-              </a:spcBef>
-              <a:buFont typeface="Arial" panose="020B0604020202020204" pitchFamily="34" charset="0"/>
-              <a:buNone/>
-              <a:defRPr sz="2000" kern="1200">
-                <a:solidFill>
-                  <a:schemeClr val="tx1"/>
-                </a:solidFill>
-                <a:latin typeface="+mn-lt"/>
-                <a:ea typeface="+mn-ea"/>
-                <a:cs typeface="+mn-cs"/>
-              </a:defRPr>
-            </a:lvl2pPr>
-            <a:lvl3pPr marL="914400" indent="0" algn="ctr" defTabSz="914400" rtl="0" eaLnBrk="1" latinLnBrk="0" hangingPunct="1">
-              <a:lnSpc>
-                <a:spcPct val="90000"/>
-              </a:lnSpc>
-              <a:spcBef>
-                <a:spcPts val="500"/>
-              </a:spcBef>
-              <a:buFont typeface="Arial" panose="020B0604020202020204" pitchFamily="34" charset="0"/>
-              <a:buNone/>
-              <a:defRPr sz="1800" kern="1200">
-                <a:solidFill>
-                  <a:schemeClr val="tx1"/>
-                </a:solidFill>
-                <a:latin typeface="+mn-lt"/>
-                <a:ea typeface="+mn-ea"/>
-                <a:cs typeface="+mn-cs"/>
-              </a:defRPr>
-            </a:lvl3pPr>
-            <a:lvl4pPr marL="1371600" indent="0" algn="ctr" defTabSz="914400" rtl="0" eaLnBrk="1" latinLnBrk="0" hangingPunct="1">
-              <a:lnSpc>
-                <a:spcPct val="90000"/>
-              </a:lnSpc>
-              <a:spcBef>
-                <a:spcPts val="500"/>
-              </a:spcBef>
-              <a:buFont typeface="Arial" panose="020B0604020202020204" pitchFamily="34" charset="0"/>
-              <a:buNone/>
-              <a:defRPr sz="1600" kern="1200">
-                <a:solidFill>
-                  <a:schemeClr val="tx1"/>
-                </a:solidFill>
-                <a:latin typeface="+mn-lt"/>
-                <a:ea typeface="+mn-ea"/>
-                <a:cs typeface="+mn-cs"/>
-              </a:defRPr>
-            </a:lvl4pPr>
-            <a:lvl5pPr marL="1828800" indent="0" algn="ctr" defTabSz="914400" rtl="0" eaLnBrk="1" latinLnBrk="0" hangingPunct="1">
-              <a:lnSpc>
-                <a:spcPct val="90000"/>
-              </a:lnSpc>
-              <a:spcBef>
-                <a:spcPts val="500"/>
-              </a:spcBef>
-              <a:buFont typeface="Arial" panose="020B0604020202020204" pitchFamily="34" charset="0"/>
-              <a:buNone/>
-              <a:defRPr sz="1600" kern="1200">
-                <a:solidFill>
-                  <a:schemeClr val="tx1"/>
-                </a:solidFill>
-                <a:latin typeface="+mn-lt"/>
-                <a:ea typeface="+mn-ea"/>
-                <a:cs typeface="+mn-cs"/>
-              </a:defRPr>
-            </a:lvl5pPr>
-            <a:lvl6pPr marL="2286000" indent="0" algn="ctr" defTabSz="914400" rtl="0" eaLnBrk="1" latinLnBrk="0" hangingPunct="1">
-              <a:lnSpc>
-                <a:spcPct val="90000"/>
-              </a:lnSpc>
-              <a:spcBef>
-                <a:spcPts val="500"/>
-              </a:spcBef>
-              <a:buFont typeface="Arial" panose="020B0604020202020204" pitchFamily="34" charset="0"/>
-              <a:buNone/>
-              <a:defRPr sz="1600" kern="1200">
-                <a:solidFill>
-                  <a:schemeClr val="tx1"/>
-                </a:solidFill>
-                <a:latin typeface="+mn-lt"/>
-                <a:ea typeface="+mn-ea"/>
-                <a:cs typeface="+mn-cs"/>
-              </a:defRPr>
-            </a:lvl6pPr>
-            <a:lvl7pPr marL="2743200" indent="0" algn="ctr" defTabSz="914400" rtl="0" eaLnBrk="1" latinLnBrk="0" hangingPunct="1">
-              <a:lnSpc>
-                <a:spcPct val="90000"/>
-              </a:lnSpc>
-              <a:spcBef>
-                <a:spcPts val="500"/>
-              </a:spcBef>
-              <a:buFont typeface="Arial" panose="020B0604020202020204" pitchFamily="34" charset="0"/>
-              <a:buNone/>
-              <a:defRPr sz="1600" kern="1200">
-                <a:solidFill>
-                  <a:schemeClr val="tx1"/>
-                </a:solidFill>
-                <a:latin typeface="+mn-lt"/>
-                <a:ea typeface="+mn-ea"/>
-                <a:cs typeface="+mn-cs"/>
-              </a:defRPr>
-            </a:lvl7pPr>
-            <a:lvl8pPr marL="3200400" indent="0" algn="ctr" defTabSz="914400" rtl="0" eaLnBrk="1" latinLnBrk="0" hangingPunct="1">
-              <a:lnSpc>
-                <a:spcPct val="90000"/>
-              </a:lnSpc>
-              <a:spcBef>
-                <a:spcPts val="500"/>
-              </a:spcBef>
-              <a:buFont typeface="Arial" panose="020B0604020202020204" pitchFamily="34" charset="0"/>
-              <a:buNone/>
-              <a:defRPr sz="1600" kern="1200">
-                <a:solidFill>
-                  <a:schemeClr val="tx1"/>
-                </a:solidFill>
-                <a:latin typeface="+mn-lt"/>
-                <a:ea typeface="+mn-ea"/>
-                <a:cs typeface="+mn-cs"/>
-              </a:defRPr>
-            </a:lvl8pPr>
-            <a:lvl9pPr marL="3657600" indent="0" algn="ctr" defTabSz="914400" rtl="0" eaLnBrk="1" latinLnBrk="0" hangingPunct="1">
-              <a:lnSpc>
-                <a:spcPct val="90000"/>
-              </a:lnSpc>
-              <a:spcBef>
-                <a:spcPts val="500"/>
-              </a:spcBef>
-              <a:buFont typeface="Arial" panose="020B0604020202020204" pitchFamily="34" charset="0"/>
-              <a:buNone/>
-              <a:defRPr sz="1600" kern="1200">
-                <a:solidFill>
-                  <a:schemeClr val="tx1"/>
-                </a:solidFill>
-                <a:latin typeface="+mn-lt"/>
-                <a:ea typeface="+mn-ea"/>
-                <a:cs typeface="+mn-cs"/>
-              </a:defRPr>
-            </a:lvl9pPr>
-          </a:lstStyle>
-          <a:p>
-            <a:pPr algn="l"/>
-            <a:r>
-              <a:rPr lang="en-US" sz="1800" dirty="0"/>
-              <a:t>WHAT IS AI?</a:t>
-            </a:r>
-          </a:p>
-          <a:p>
-            <a:pPr algn="l"/>
-            <a:r>
-              <a:rPr lang="en-US" sz="1800" dirty="0"/>
-              <a:t>“</a:t>
-            </a:r>
-            <a:r>
-              <a:rPr lang="en-US" sz="1800" b="1" dirty="0"/>
-              <a:t>Algorithms</a:t>
-            </a:r>
-            <a:r>
-              <a:rPr lang="en-US" sz="1800" dirty="0"/>
-              <a:t> enabled by </a:t>
-            </a:r>
-            <a:r>
-              <a:rPr lang="en-US" sz="1800" b="1" dirty="0"/>
-              <a:t>constraints</a:t>
-            </a:r>
-            <a:r>
-              <a:rPr lang="en-US" sz="1800" dirty="0"/>
-              <a:t> &amp; exposed by </a:t>
-            </a:r>
-            <a:r>
-              <a:rPr lang="en-US" sz="1800" b="1" dirty="0"/>
-              <a:t>representations</a:t>
-            </a:r>
-            <a:r>
-              <a:rPr lang="en-US" sz="1800" dirty="0"/>
-              <a:t> that support models targeted at </a:t>
-            </a:r>
-            <a:r>
-              <a:rPr lang="en-US" sz="1800" b="1" dirty="0"/>
-              <a:t>thinking</a:t>
-            </a:r>
-            <a:r>
-              <a:rPr lang="en-US" sz="1800" dirty="0"/>
-              <a:t>, </a:t>
-            </a:r>
-            <a:r>
-              <a:rPr lang="en-US" sz="1800" b="1" dirty="0"/>
-              <a:t>perception</a:t>
-            </a:r>
-            <a:r>
-              <a:rPr lang="en-US" sz="1800" dirty="0"/>
-              <a:t> and </a:t>
-            </a:r>
-            <a:r>
-              <a:rPr lang="en-US" sz="1800" b="1" dirty="0"/>
-              <a:t>action</a:t>
-            </a:r>
-            <a:r>
-              <a:rPr lang="en-US" sz="1800" dirty="0"/>
-              <a:t>.” 	</a:t>
-            </a:r>
-          </a:p>
-          <a:p>
-            <a:pPr algn="r"/>
-            <a:r>
-              <a:rPr lang="en-US" sz="1800" dirty="0"/>
-              <a:t>MIT Prof. Patrick Winston</a:t>
-            </a:r>
-          </a:p>
-          <a:p>
-            <a:pPr indent="-228600" algn="l">
-              <a:buFont typeface="Arial" panose="020B0604020202020204" pitchFamily="34" charset="0"/>
-              <a:buChar char="•"/>
-            </a:pPr>
-            <a:endParaRPr lang="en-US" sz="1800" dirty="0"/>
-          </a:p>
-        </p:txBody>
-      </p:sp>
-      <p:cxnSp>
-        <p:nvCxnSpPr>
-          <p:cNvPr id="6" name="Straight Connector 5">
-            <a:extLst>
-              <a:ext uri="{FF2B5EF4-FFF2-40B4-BE49-F238E27FC236}">
-                <a16:creationId xmlns:a16="http://schemas.microsoft.com/office/drawing/2014/main" id="{54114226-73D0-4FF0-956C-B62212123485}"/>
-              </a:ext>
-            </a:extLst>
-          </p:cNvPr>
-          <p:cNvCxnSpPr>
-            <a:cxnSpLocks/>
-          </p:cNvCxnSpPr>
-          <p:nvPr/>
-        </p:nvCxnSpPr>
-        <p:spPr>
-          <a:xfrm>
-            <a:off x="5532472" y="4550418"/>
-            <a:ext cx="359570" cy="287481"/>
-          </a:xfrm>
-          <a:prstGeom prst="line">
-            <a:avLst/>
-          </a:prstGeom>
-        </p:spPr>
-        <p:style>
-          <a:lnRef idx="1">
-            <a:schemeClr val="accent1"/>
-          </a:lnRef>
-          <a:fillRef idx="0">
-            <a:schemeClr val="accent1"/>
-          </a:fillRef>
-          <a:effectRef idx="0">
-            <a:schemeClr val="accent1"/>
-          </a:effectRef>
-          <a:fontRef idx="minor">
-            <a:schemeClr val="tx1"/>
-          </a:fontRef>
-        </p:style>
-      </p:cxnSp>
-    </p:spTree>
-    <p:extLst>
-      <p:ext uri="{BB962C8B-B14F-4D97-AF65-F5344CB8AC3E}">
-        <p14:creationId xmlns:p14="http://schemas.microsoft.com/office/powerpoint/2010/main" val="2618803147"/>
-      </p:ext>
-    </p:extLst>
-  </p:cSld>
-  <p:clrMapOvr>
-    <a:masterClrMapping/>
-  </p:clrMapOvr>
-</p:sld>
-</file>
-
-<file path=ppt/slides/slide40.xml><?xml version="1.0" encoding="utf-8"?>
+<file path=ppt/slides/slide41.xml><?xml version="1.0" encoding="utf-8"?>
 <p:sld xmlns:a="http://schemas.openxmlformats.org/drawingml/2006/main" xmlns:r="http://schemas.openxmlformats.org/officeDocument/2006/relationships" xmlns:p="http://schemas.openxmlformats.org/presentationml/2006/main">
   <p:cSld>
     <p:spTree>
@@ -12977,17 +13069,16 @@
           <a:p>
             <a:pPr algn="l"/>
             <a:r>
-              <a:rPr lang="en-US" sz="4800" dirty="0" smtClean="0"/>
+              <a:rPr lang="en-US" sz="4800" dirty="0"/>
               <a:t>Available color (domain): 4</a:t>
             </a:r>
           </a:p>
           <a:p>
             <a:pPr algn="l"/>
             <a:r>
-              <a:rPr lang="en-US" sz="4800" dirty="0" smtClean="0"/>
-              <a:t>State next to each other: different color</a:t>
-            </a:r>
-            <a:endParaRPr lang="en-US" sz="4800" dirty="0"/>
+              <a:rPr lang="en-US" sz="4800" dirty="0"/>
+              <a:t>States next to each other: different color</a:t>
+            </a:r>
           </a:p>
         </p:txBody>
       </p:sp>
@@ -13015,13 +13106,8 @@
           <a:p>
             <a:r>
               <a:rPr lang="en-US" sz="3600" dirty="0"/>
-              <a:t>Constraints: </a:t>
-            </a:r>
-            <a:r>
-              <a:rPr lang="en-US" sz="3600" dirty="0" smtClean="0"/>
-              <a:t>Coloring USA Maps</a:t>
-            </a:r>
-            <a:endParaRPr lang="en-US" sz="3600" dirty="0"/>
+              <a:t>Constraints: Coloring USA Maps</a:t>
+            </a:r>
           </a:p>
           <a:p>
             <a:endParaRPr lang="en-US" dirty="0"/>
@@ -13160,18 +13246,13 @@
           <a:p>
             <a:pPr algn="ctr"/>
             <a:r>
-              <a:rPr lang="en-US" dirty="0" smtClean="0">
+              <a:rPr lang="en-US" dirty="0">
                 <a:solidFill>
                   <a:schemeClr val="tx1"/>
                 </a:solidFill>
               </a:rPr>
               <a:t>RGBY</a:t>
             </a:r>
-            <a:endParaRPr lang="en-US" dirty="0">
-              <a:solidFill>
-                <a:schemeClr val="tx1"/>
-              </a:solidFill>
-            </a:endParaRPr>
           </a:p>
         </p:txBody>
       </p:sp>
@@ -13440,10 +13521,9 @@
           <a:p>
             <a:pPr algn="ctr"/>
             <a:r>
-              <a:rPr lang="en-US" dirty="0" smtClean="0"/>
+              <a:rPr lang="en-US" dirty="0"/>
               <a:t>B</a:t>
             </a:r>
-            <a:endParaRPr lang="en-US" dirty="0"/>
           </a:p>
         </p:txBody>
       </p:sp>
@@ -13581,10 +13661,9 @@
           <a:p>
             <a:pPr algn="ctr"/>
             <a:r>
-              <a:rPr lang="en-US" dirty="0" smtClean="0"/>
+              <a:rPr lang="en-US" dirty="0"/>
               <a:t>G</a:t>
             </a:r>
-            <a:endParaRPr lang="en-US" dirty="0"/>
           </a:p>
         </p:txBody>
       </p:sp>
@@ -13722,10 +13801,9 @@
           <a:p>
             <a:pPr algn="ctr"/>
             <a:r>
-              <a:rPr lang="en-US" dirty="0" smtClean="0"/>
+              <a:rPr lang="en-US" dirty="0"/>
               <a:t>R</a:t>
             </a:r>
-            <a:endParaRPr lang="en-US" dirty="0"/>
           </a:p>
         </p:txBody>
       </p:sp>
@@ -13846,10 +13924,9 @@
           </a:lstStyle>
           <a:p>
             <a:r>
-              <a:rPr lang="en-US" dirty="0" smtClean="0"/>
+              <a:rPr lang="en-US" dirty="0"/>
               <a:t>TX</a:t>
             </a:r>
-            <a:endParaRPr lang="en-US" dirty="0"/>
           </a:p>
         </p:txBody>
       </p:sp>
@@ -13970,10 +14047,9 @@
           </a:lstStyle>
           <a:p>
             <a:r>
-              <a:rPr lang="en-US" dirty="0" smtClean="0"/>
+              <a:rPr lang="en-US" dirty="0"/>
               <a:t>OK</a:t>
             </a:r>
-            <a:endParaRPr lang="en-US" dirty="0"/>
           </a:p>
         </p:txBody>
       </p:sp>
@@ -14094,10 +14170,9 @@
           </a:lstStyle>
           <a:p>
             <a:r>
-              <a:rPr lang="en-US" dirty="0" smtClean="0"/>
+              <a:rPr lang="en-US" dirty="0"/>
               <a:t>AK</a:t>
             </a:r>
-            <a:endParaRPr lang="en-US" dirty="0"/>
           </a:p>
         </p:txBody>
       </p:sp>
@@ -14114,7 +14189,7 @@
 </p:sld>
 </file>
 
-<file path=ppt/slides/slide41.xml><?xml version="1.0" encoding="utf-8"?>
+<file path=ppt/slides/slide42.xml><?xml version="1.0" encoding="utf-8"?>
 <p:sld xmlns:a="http://schemas.openxmlformats.org/drawingml/2006/main" xmlns:r="http://schemas.openxmlformats.org/officeDocument/2006/relationships" xmlns:p="http://schemas.openxmlformats.org/presentationml/2006/main">
   <p:cSld>
     <p:spTree>
@@ -14143,6 +14218,140 @@
         </p:nvSpPr>
         <p:spPr>
           <a:xfrm>
+            <a:off x="477672" y="731520"/>
+            <a:ext cx="11068334" cy="4553173"/>
+          </a:xfrm>
+        </p:spPr>
+        <p:txBody>
+          <a:bodyPr>
+            <a:normAutofit lnSpcReduction="10000"/>
+          </a:bodyPr>
+          <a:lstStyle/>
+          <a:p>
+            <a:pPr algn="l"/>
+            <a:r>
+              <a:rPr lang="en-US" sz="4800" dirty="0"/>
+              <a:t>F1: BOS -&gt; JFK </a:t>
+            </a:r>
+          </a:p>
+          <a:p>
+            <a:pPr algn="l"/>
+            <a:r>
+              <a:rPr lang="en-US" sz="4800" dirty="0"/>
+              <a:t>F2:              JFK-&gt;BOS</a:t>
+            </a:r>
+          </a:p>
+          <a:p>
+            <a:pPr algn="l"/>
+            <a:r>
+              <a:rPr lang="en-US" sz="4800" dirty="0"/>
+              <a:t>F3:                        BOS -&gt; JFK</a:t>
+            </a:r>
+          </a:p>
+          <a:p>
+            <a:pPr algn="l"/>
+            <a:r>
+              <a:rPr lang="en-US" sz="4800" dirty="0"/>
+              <a:t>F4:                                     JFK-&gt;BOS</a:t>
+            </a:r>
+          </a:p>
+          <a:p>
+            <a:pPr algn="l"/>
+            <a:r>
+              <a:rPr lang="en-US" sz="4800" dirty="0"/>
+              <a:t>F5: BOS -------------------------------</a:t>
+            </a:r>
+            <a:r>
+              <a:rPr lang="en-US" sz="4800" dirty="0">
+                <a:sym typeface="Wingdings" panose="05000000000000000000" pitchFamily="2" charset="2"/>
+              </a:rPr>
+              <a:t> LAX</a:t>
+            </a:r>
+            <a:endParaRPr lang="en-US" sz="4800" dirty="0"/>
+          </a:p>
+          <a:p>
+            <a:pPr algn="l"/>
+            <a:r>
+              <a:rPr lang="en-US" sz="4800" dirty="0"/>
+              <a:t>How many planes are needed? 4?</a:t>
+            </a:r>
+          </a:p>
+        </p:txBody>
+      </p:sp>
+      <p:sp>
+        <p:nvSpPr>
+          <p:cNvPr id="4" name="TextBox 3"/>
+          <p:cNvSpPr txBox="1"/>
+          <p:nvPr/>
+        </p:nvSpPr>
+        <p:spPr>
+          <a:xfrm>
+            <a:off x="97000" y="82622"/>
+            <a:ext cx="11449006" cy="923330"/>
+          </a:xfrm>
+          <a:prstGeom prst="rect">
+            <a:avLst/>
+          </a:prstGeom>
+          <a:noFill/>
+        </p:spPr>
+        <p:txBody>
+          <a:bodyPr wrap="square" rtlCol="0">
+            <a:spAutoFit/>
+          </a:bodyPr>
+          <a:lstStyle/>
+          <a:p>
+            <a:r>
+              <a:rPr lang="en-US" sz="3600" dirty="0"/>
+              <a:t>Constraints: Resource Allocations</a:t>
+            </a:r>
+          </a:p>
+          <a:p>
+            <a:endParaRPr lang="en-US" dirty="0"/>
+          </a:p>
+        </p:txBody>
+      </p:sp>
+    </p:spTree>
+    <p:extLst>
+      <p:ext uri="{BB962C8B-B14F-4D97-AF65-F5344CB8AC3E}">
+        <p14:creationId xmlns:p14="http://schemas.microsoft.com/office/powerpoint/2010/main" val="4269374643"/>
+      </p:ext>
+    </p:extLst>
+  </p:cSld>
+  <p:clrMapOvr>
+    <a:masterClrMapping/>
+  </p:clrMapOvr>
+</p:sld>
+</file>
+
+<file path=ppt/slides/slide43.xml><?xml version="1.0" encoding="utf-8"?>
+<p:sld xmlns:a="http://schemas.openxmlformats.org/drawingml/2006/main" xmlns:r="http://schemas.openxmlformats.org/officeDocument/2006/relationships" xmlns:p="http://schemas.openxmlformats.org/presentationml/2006/main">
+  <p:cSld>
+    <p:spTree>
+      <p:nvGrpSpPr>
+        <p:cNvPr id="1" name=""/>
+        <p:cNvGrpSpPr/>
+        <p:nvPr/>
+      </p:nvGrpSpPr>
+      <p:grpSpPr>
+        <a:xfrm>
+          <a:off x="0" y="0"/>
+          <a:ext cx="0" cy="0"/>
+          <a:chOff x="0" y="0"/>
+          <a:chExt cx="0" cy="0"/>
+        </a:xfrm>
+      </p:grpSpPr>
+      <p:sp>
+        <p:nvSpPr>
+          <p:cNvPr id="3" name="Subtitle 2"/>
+          <p:cNvSpPr>
+            <a:spLocks noGrp="1"/>
+          </p:cNvSpPr>
+          <p:nvPr>
+            <p:ph type="subTitle" idx="1"/>
+          </p:nvPr>
+        </p:nvSpPr>
+        <p:spPr>
+          <a:xfrm>
             <a:off x="1166948" y="815294"/>
             <a:ext cx="9144000" cy="5498419"/>
           </a:xfrm>
@@ -14197,10 +14406,6 @@
           </a:p>
           <a:p>
             <a:pPr algn="l"/>
-            <a:r>
-              <a:rPr lang="en-US" sz="6600" dirty="0"/>
-              <a:t/>
-            </a:r>
             <a:br>
               <a:rPr lang="en-US" sz="6600" dirty="0"/>
             </a:br>
@@ -17002,7 +17207,7 @@
             <a:pPr algn="l"/>
             <a:r>
               <a:rPr lang="en-US" sz="4900" dirty="0"/>
-              <a:t>2000s AI/ML approach is totally different.</a:t>
+              <a:t>2015s AI/ML approach is totally different.</a:t>
             </a:r>
           </a:p>
         </p:txBody>
@@ -17572,15 +17777,6 @@
 </file>
 
 <file path=customXml/item1.xml><?xml version="1.0" encoding="utf-8"?>
-<?mso-contentType ?>
-<FormTemplates xmlns="http://schemas.microsoft.com/sharepoint/v3/contenttype/forms">
-  <Display>DocumentLibraryForm</Display>
-  <Edit>DocumentLibraryForm</Edit>
-  <New>DocumentLibraryForm</New>
-</FormTemplates>
-</file>
-
-<file path=customXml/item2.xml><?xml version="1.0" encoding="utf-8"?>
 <ct:contentTypeSchema xmlns:ct="http://schemas.microsoft.com/office/2006/metadata/contentType" xmlns:ma="http://schemas.microsoft.com/office/2006/metadata/properties/metaAttributes" ct:_="" ma:_="" ma:contentTypeName="Document" ma:contentTypeID="0x01010040A75B615E1C194CABC80F3CAEA6E4E5" ma:contentTypeVersion="9" ma:contentTypeDescription="Create a new document." ma:contentTypeScope="" ma:versionID="4a1cf2a28ba0a9e91fab658e05820dde">
   <xsd:schema xmlns:xsd="http://www.w3.org/2001/XMLSchema" xmlns:xs="http://www.w3.org/2001/XMLSchema" xmlns:p="http://schemas.microsoft.com/office/2006/metadata/properties" xmlns:ns3="d97dfd74-0758-4aac-b7c3-4f13d10397e8" xmlns:ns4="851bce1a-01c5-49d9-967d-64af5945ebef" targetNamespace="http://schemas.microsoft.com/office/2006/metadata/properties" ma:root="true" ma:fieldsID="090359357a8ddcd8bb6253bd66cd91d0" ns3:_="" ns4:_="">
     <xsd:import namespace="d97dfd74-0758-4aac-b7c3-4f13d10397e8"/>
@@ -17777,6 +17973,15 @@
 </ct:contentTypeSchema>
 </file>
 
+<file path=customXml/item2.xml><?xml version="1.0" encoding="utf-8"?>
+<?mso-contentType ?>
+<FormTemplates xmlns="http://schemas.microsoft.com/sharepoint/v3/contenttype/forms">
+  <Display>DocumentLibraryForm</Display>
+  <Edit>DocumentLibraryForm</Edit>
+  <New>DocumentLibraryForm</New>
+</FormTemplates>
+</file>
+
 <file path=customXml/item3.xml><?xml version="1.0" encoding="utf-8"?>
 <p:properties xmlns:p="http://schemas.microsoft.com/office/2006/metadata/properties" xmlns:xsi="http://www.w3.org/2001/XMLSchema-instance" xmlns:pc="http://schemas.microsoft.com/office/infopath/2007/PartnerControls">
   <documentManagement/>
@@ -17784,14 +17989,6 @@
 </file>
 
 <file path=customXml/itemProps1.xml><?xml version="1.0" encoding="utf-8"?>
-<ds:datastoreItem xmlns:ds="http://schemas.openxmlformats.org/officeDocument/2006/customXml" ds:itemID="{9A56549F-9000-409B-8EE1-A7AE4257567A}">
-  <ds:schemaRefs>
-    <ds:schemaRef ds:uri="http://schemas.microsoft.com/sharepoint/v3/contenttype/forms"/>
-  </ds:schemaRefs>
-</ds:datastoreItem>
-</file>
-
-<file path=customXml/itemProps2.xml><?xml version="1.0" encoding="utf-8"?>
 <ds:datastoreItem xmlns:ds="http://schemas.openxmlformats.org/officeDocument/2006/customXml" ds:itemID="{A173A3F4-56E8-4506-812D-90D9C8F7ED90}">
   <ds:schemaRefs>
     <ds:schemaRef ds:uri="http://schemas.microsoft.com/office/2006/metadata/contentType"/>
@@ -17806,6 +18003,14 @@
     <ds:schemaRef ds:uri="http://purl.org/dc/elements/1.1/"/>
     <ds:schemaRef ds:uri="http://purl.org/dc/terms/"/>
     <ds:schemaRef ds:uri="http://schemas.microsoft.com/internal/obd"/>
+  </ds:schemaRefs>
+</ds:datastoreItem>
+</file>
+
+<file path=customXml/itemProps2.xml><?xml version="1.0" encoding="utf-8"?>
+<ds:datastoreItem xmlns:ds="http://schemas.openxmlformats.org/officeDocument/2006/customXml" ds:itemID="{9A56549F-9000-409B-8EE1-A7AE4257567A}">
+  <ds:schemaRefs>
+    <ds:schemaRef ds:uri="http://schemas.microsoft.com/sharepoint/v3/contenttype/forms"/>
   </ds:schemaRefs>
 </ds:datastoreItem>
 </file>

</xml_diff>